<commit_message>
Changes to PPW. Added LumberCSV for comparison vs housing inventory
</commit_message>
<xml_diff>
--- a/Texas Housing Market Analysis PowerPoint.pptx
+++ b/Texas Housing Market Analysis PowerPoint.pptx
@@ -12,13 +12,13 @@
     <p:sldId id="260" r:id="rId6"/>
     <p:sldId id="262" r:id="rId7"/>
     <p:sldId id="266" r:id="rId8"/>
-    <p:sldId id="263" r:id="rId9"/>
-    <p:sldId id="267" r:id="rId10"/>
-    <p:sldId id="268" r:id="rId11"/>
-    <p:sldId id="269" r:id="rId12"/>
-    <p:sldId id="270" r:id="rId13"/>
-    <p:sldId id="271" r:id="rId14"/>
-    <p:sldId id="264" r:id="rId15"/>
+    <p:sldId id="272" r:id="rId9"/>
+    <p:sldId id="273" r:id="rId10"/>
+    <p:sldId id="274" r:id="rId11"/>
+    <p:sldId id="275" r:id="rId12"/>
+    <p:sldId id="276" r:id="rId13"/>
+    <p:sldId id="277" r:id="rId14"/>
+    <p:sldId id="278" r:id="rId15"/>
     <p:sldId id="265" r:id="rId16"/>
   </p:sldIdLst>
   <p:sldSz cx="12192000" cy="6858000"/>
@@ -860,7 +860,7 @@
           <a:p>
             <a:fld id="{5D33F7AF-6E39-4A91-A34E-7C3B5DD60A25}" type="datetimeFigureOut">
               <a:rPr lang="en-US" smtClean="0"/>
-              <a:t>6/8/2021</a:t>
+              <a:t>6/9/2021</a:t>
             </a:fld>
             <a:endParaRPr lang="en-US"/>
           </a:p>
@@ -1111,7 +1111,7 @@
           <a:p>
             <a:fld id="{5D33F7AF-6E39-4A91-A34E-7C3B5DD60A25}" type="datetimeFigureOut">
               <a:rPr lang="en-US" smtClean="0"/>
-              <a:t>6/8/2021</a:t>
+              <a:t>6/9/2021</a:t>
             </a:fld>
             <a:endParaRPr lang="en-US"/>
           </a:p>
@@ -1425,7 +1425,7 @@
           <a:p>
             <a:fld id="{5D33F7AF-6E39-4A91-A34E-7C3B5DD60A25}" type="datetimeFigureOut">
               <a:rPr lang="en-US" smtClean="0"/>
-              <a:t>6/8/2021</a:t>
+              <a:t>6/9/2021</a:t>
             </a:fld>
             <a:endParaRPr lang="en-US"/>
           </a:p>
@@ -1766,7 +1766,7 @@
           <a:p>
             <a:fld id="{5D33F7AF-6E39-4A91-A34E-7C3B5DD60A25}" type="datetimeFigureOut">
               <a:rPr lang="en-US" smtClean="0"/>
-              <a:t>6/8/2021</a:t>
+              <a:t>6/9/2021</a:t>
             </a:fld>
             <a:endParaRPr lang="en-US"/>
           </a:p>
@@ -2080,7 +2080,7 @@
           <a:p>
             <a:fld id="{5D33F7AF-6E39-4A91-A34E-7C3B5DD60A25}" type="datetimeFigureOut">
               <a:rPr lang="en-US" smtClean="0"/>
-              <a:t>6/8/2021</a:t>
+              <a:t>6/9/2021</a:t>
             </a:fld>
             <a:endParaRPr lang="en-US"/>
           </a:p>
@@ -2473,7 +2473,7 @@
           <a:p>
             <a:fld id="{5D33F7AF-6E39-4A91-A34E-7C3B5DD60A25}" type="datetimeFigureOut">
               <a:rPr lang="en-US" smtClean="0"/>
-              <a:t>6/8/2021</a:t>
+              <a:t>6/9/2021</a:t>
             </a:fld>
             <a:endParaRPr lang="en-US"/>
           </a:p>
@@ -2643,7 +2643,7 @@
           <a:p>
             <a:fld id="{5D33F7AF-6E39-4A91-A34E-7C3B5DD60A25}" type="datetimeFigureOut">
               <a:rPr lang="en-US" smtClean="0"/>
-              <a:t>6/8/2021</a:t>
+              <a:t>6/9/2021</a:t>
             </a:fld>
             <a:endParaRPr lang="en-US"/>
           </a:p>
@@ -2823,7 +2823,7 @@
           <a:p>
             <a:fld id="{5D33F7AF-6E39-4A91-A34E-7C3B5DD60A25}" type="datetimeFigureOut">
               <a:rPr lang="en-US" smtClean="0"/>
-              <a:t>6/8/2021</a:t>
+              <a:t>6/9/2021</a:t>
             </a:fld>
             <a:endParaRPr lang="en-US"/>
           </a:p>
@@ -2999,7 +2999,7 @@
           <a:p>
             <a:fld id="{5D33F7AF-6E39-4A91-A34E-7C3B5DD60A25}" type="datetimeFigureOut">
               <a:rPr lang="en-US" smtClean="0"/>
-              <a:t>6/8/2021</a:t>
+              <a:t>6/9/2021</a:t>
             </a:fld>
             <a:endParaRPr lang="en-US"/>
           </a:p>
@@ -3246,7 +3246,7 @@
           <a:p>
             <a:fld id="{5D33F7AF-6E39-4A91-A34E-7C3B5DD60A25}" type="datetimeFigureOut">
               <a:rPr lang="en-US" smtClean="0"/>
-              <a:t>6/8/2021</a:t>
+              <a:t>6/9/2021</a:t>
             </a:fld>
             <a:endParaRPr lang="en-US"/>
           </a:p>
@@ -3478,7 +3478,7 @@
           <a:p>
             <a:fld id="{5D33F7AF-6E39-4A91-A34E-7C3B5DD60A25}" type="datetimeFigureOut">
               <a:rPr lang="en-US" smtClean="0"/>
-              <a:t>6/8/2021</a:t>
+              <a:t>6/9/2021</a:t>
             </a:fld>
             <a:endParaRPr lang="en-US"/>
           </a:p>
@@ -3852,7 +3852,7 @@
           <a:p>
             <a:fld id="{5D33F7AF-6E39-4A91-A34E-7C3B5DD60A25}" type="datetimeFigureOut">
               <a:rPr lang="en-US" smtClean="0"/>
-              <a:t>6/8/2021</a:t>
+              <a:t>6/9/2021</a:t>
             </a:fld>
             <a:endParaRPr lang="en-US"/>
           </a:p>
@@ -3975,7 +3975,7 @@
           <a:p>
             <a:fld id="{5D33F7AF-6E39-4A91-A34E-7C3B5DD60A25}" type="datetimeFigureOut">
               <a:rPr lang="en-US" smtClean="0"/>
-              <a:t>6/8/2021</a:t>
+              <a:t>6/9/2021</a:t>
             </a:fld>
             <a:endParaRPr lang="en-US"/>
           </a:p>
@@ -4070,7 +4070,7 @@
           <a:p>
             <a:fld id="{5D33F7AF-6E39-4A91-A34E-7C3B5DD60A25}" type="datetimeFigureOut">
               <a:rPr lang="en-US" smtClean="0"/>
-              <a:t>6/8/2021</a:t>
+              <a:t>6/9/2021</a:t>
             </a:fld>
             <a:endParaRPr lang="en-US"/>
           </a:p>
@@ -4325,7 +4325,7 @@
           <a:p>
             <a:fld id="{5D33F7AF-6E39-4A91-A34E-7C3B5DD60A25}" type="datetimeFigureOut">
               <a:rPr lang="en-US" smtClean="0"/>
-              <a:t>6/8/2021</a:t>
+              <a:t>6/9/2021</a:t>
             </a:fld>
             <a:endParaRPr lang="en-US"/>
           </a:p>
@@ -4588,7 +4588,7 @@
           <a:p>
             <a:fld id="{5D33F7AF-6E39-4A91-A34E-7C3B5DD60A25}" type="datetimeFigureOut">
               <a:rPr lang="en-US" smtClean="0"/>
-              <a:t>6/8/2021</a:t>
+              <a:t>6/9/2021</a:t>
             </a:fld>
             <a:endParaRPr lang="en-US"/>
           </a:p>
@@ -5331,7 +5331,7 @@
           <a:p>
             <a:fld id="{5D33F7AF-6E39-4A91-A34E-7C3B5DD60A25}" type="datetimeFigureOut">
               <a:rPr lang="en-US" smtClean="0"/>
-              <a:t>6/8/2021</a:t>
+              <a:t>6/9/2021</a:t>
             </a:fld>
             <a:endParaRPr lang="en-US"/>
           </a:p>
@@ -5910,16 +5910,17 @@
         </p:nvSpPr>
         <p:spPr>
           <a:xfrm>
-            <a:off x="5240936" y="2305878"/>
-            <a:ext cx="4883726" cy="2665561"/>
+            <a:off x="6095972" y="2810552"/>
+            <a:ext cx="4883726" cy="1485072"/>
           </a:xfrm>
         </p:spPr>
         <p:txBody>
-          <a:bodyPr>
+          <a:bodyPr anchor="ctr">
             <a:normAutofit/>
           </a:bodyPr>
           <a:lstStyle/>
           <a:p>
+            <a:pPr algn="l"/>
             <a:r>
               <a:rPr lang="en-US" sz="4000" b="1" dirty="0"/>
               <a:t>Texas Housing Market Analysis</a:t>
@@ -5945,22 +5946,21 @@
         </p:nvSpPr>
         <p:spPr>
           <a:xfrm>
-            <a:off x="6095972" y="5076519"/>
-            <a:ext cx="5172103" cy="838200"/>
+            <a:off x="6095973" y="4172081"/>
+            <a:ext cx="4133877" cy="533269"/>
           </a:xfrm>
         </p:spPr>
         <p:txBody>
           <a:bodyPr>
-            <a:normAutofit/>
+            <a:normAutofit fontScale="92500"/>
           </a:bodyPr>
           <a:lstStyle/>
           <a:p>
+            <a:pPr algn="l"/>
             <a:r>
               <a:rPr lang="en-US" dirty="0"/>
               <a:t>Data Analytics &amp; Visualization Project #1</a:t>
             </a:r>
-          </a:p>
-          <a:p>
             <a:endParaRPr lang="en-US" sz="2000" dirty="0"/>
           </a:p>
           <a:p>
@@ -5984,8 +5984,8 @@
         </p:nvSpPr>
         <p:spPr>
           <a:xfrm>
-            <a:off x="4465983" y="5724939"/>
-            <a:ext cx="6973542" cy="990186"/>
+            <a:off x="5476847" y="4705350"/>
+            <a:ext cx="4753003" cy="1328195"/>
           </a:xfrm>
           <a:prstGeom prst="rect">
             <a:avLst/>
@@ -5993,7 +5993,7 @@
         </p:spPr>
         <p:txBody>
           <a:bodyPr vert="horz" lIns="91440" tIns="45720" rIns="91440" bIns="45720" rtlCol="0">
-            <a:normAutofit fontScale="62500" lnSpcReduction="20000"/>
+            <a:normAutofit fontScale="55000" lnSpcReduction="20000"/>
           </a:bodyPr>
           <a:lstStyle>
             <a:lvl1pPr marL="0" indent="0" algn="ctr" defTabSz="914400" rtl="0" eaLnBrk="1" latinLnBrk="0" hangingPunct="1">
@@ -6160,12 +6160,18 @@
             </a:lvl9pPr>
           </a:lstStyle>
           <a:p>
+            <a:pPr algn="r"/>
             <a:r>
               <a:rPr lang="en-US" sz="3800" dirty="0"/>
-              <a:t>     Ali Karimi, Simon Castellanos, Jucary Estrada, Francis Escamilla   </a:t>
-            </a:r>
-          </a:p>
-          <a:p>
+              <a:t>Ali Karimi, Simon Castellanos, Jucary Estrada, Francis Escamilla</a:t>
+            </a:r>
+          </a:p>
+          <a:p>
+            <a:pPr algn="r"/>
+            <a:endParaRPr lang="en-US" sz="3800" dirty="0"/>
+          </a:p>
+          <a:p>
+            <a:pPr algn="r"/>
             <a:r>
               <a:rPr lang="en-US" sz="3800" dirty="0"/>
               <a:t>June 2021</a:t>
@@ -6198,14 +6204,6 @@
 <file path=ppt/slides/slide10.xml><?xml version="1.0" encoding="utf-8"?>
 <p:sld xmlns:a="http://schemas.openxmlformats.org/drawingml/2006/main" xmlns:r="http://schemas.openxmlformats.org/officeDocument/2006/relationships" xmlns:p="http://schemas.openxmlformats.org/presentationml/2006/main">
   <p:cSld>
-    <p:bg>
-      <p:bgPr>
-        <a:solidFill>
-          <a:schemeClr val="bg1"/>
-        </a:solidFill>
-        <a:effectLst/>
-      </p:bgPr>
-    </p:bg>
     <p:spTree>
       <p:nvGrpSpPr>
         <p:cNvPr id="1" name=""/>
@@ -6220,12 +6218,121 @@
           <a:chExt cx="0" cy="0"/>
         </a:xfrm>
       </p:grpSpPr>
+      <p:sp>
+        <p:nvSpPr>
+          <p:cNvPr id="2" name="Title 1">
+            <a:extLst>
+              <a:ext uri="{FF2B5EF4-FFF2-40B4-BE49-F238E27FC236}">
+                <a16:creationId xmlns:a16="http://schemas.microsoft.com/office/drawing/2014/main" id="{E92B9D07-598B-45D7-B29C-341FB8AA9F38}"/>
+              </a:ext>
+            </a:extLst>
+          </p:cNvPr>
+          <p:cNvSpPr>
+            <a:spLocks noGrp="1"/>
+          </p:cNvSpPr>
+          <p:nvPr>
+            <p:ph type="title"/>
+          </p:nvPr>
+        </p:nvSpPr>
+        <p:spPr>
+          <a:xfrm>
+            <a:off x="609600" y="609600"/>
+            <a:ext cx="10972800" cy="1188720"/>
+          </a:xfrm>
+        </p:spPr>
+        <p:txBody>
+          <a:bodyPr>
+            <a:normAutofit/>
+          </a:bodyPr>
+          <a:lstStyle/>
+          <a:p>
+            <a:r>
+              <a:rPr lang="en-US" sz="4400" dirty="0">
+                <a:solidFill>
+                  <a:schemeClr val="accent1"/>
+                </a:solidFill>
+              </a:rPr>
+              <a:t>Population Growth </a:t>
+            </a:r>
+          </a:p>
+        </p:txBody>
+      </p:sp>
+      <p:sp>
+        <p:nvSpPr>
+          <p:cNvPr id="3" name="Content Placeholder 2">
+            <a:extLst>
+              <a:ext uri="{FF2B5EF4-FFF2-40B4-BE49-F238E27FC236}">
+                <a16:creationId xmlns:a16="http://schemas.microsoft.com/office/drawing/2014/main" id="{8ED9684F-640E-42C2-823B-2923431F4A25}"/>
+              </a:ext>
+            </a:extLst>
+          </p:cNvPr>
+          <p:cNvSpPr>
+            <a:spLocks noGrp="1"/>
+          </p:cNvSpPr>
+          <p:nvPr>
+            <p:ph idx="1"/>
+          </p:nvPr>
+        </p:nvSpPr>
+        <p:spPr>
+          <a:xfrm>
+            <a:off x="609600" y="5886449"/>
+            <a:ext cx="8686800" cy="933781"/>
+          </a:xfrm>
+        </p:spPr>
+        <p:txBody>
+          <a:bodyPr>
+            <a:normAutofit/>
+          </a:bodyPr>
+          <a:lstStyle/>
+          <a:p>
+            <a:r>
+              <a:rPr lang="en-US" sz="1600" dirty="0"/>
+              <a:t>Population grew at a constant rate in all metropolitan areas</a:t>
+            </a:r>
+          </a:p>
+        </p:txBody>
+      </p:sp>
+      <p:sp>
+        <p:nvSpPr>
+          <p:cNvPr id="4" name="TextBox 3">
+            <a:extLst>
+              <a:ext uri="{FF2B5EF4-FFF2-40B4-BE49-F238E27FC236}">
+                <a16:creationId xmlns:a16="http://schemas.microsoft.com/office/drawing/2014/main" id="{638C66DA-09F4-4366-A640-2F6FB694F618}"/>
+              </a:ext>
+            </a:extLst>
+          </p:cNvPr>
+          <p:cNvSpPr txBox="1"/>
+          <p:nvPr/>
+        </p:nvSpPr>
+        <p:spPr>
+          <a:xfrm>
+            <a:off x="11353801" y="6042991"/>
+            <a:ext cx="598862" cy="369332"/>
+          </a:xfrm>
+          <a:prstGeom prst="rect">
+            <a:avLst/>
+          </a:prstGeom>
+          <a:noFill/>
+        </p:spPr>
+        <p:txBody>
+          <a:bodyPr wrap="square" rtlCol="0">
+            <a:spAutoFit/>
+          </a:bodyPr>
+          <a:lstStyle/>
+          <a:p>
+            <a:r>
+              <a:rPr lang="en-US" dirty="0"/>
+              <a:t>A-S</a:t>
+            </a:r>
+          </a:p>
+        </p:txBody>
+      </p:sp>
       <p:pic>
         <p:nvPicPr>
-          <p:cNvPr id="7" name="Picture 6" descr="Chart, line chart&#10;&#10;Description automatically generated">
+          <p:cNvPr id="6" name="Picture 5" descr="Chart, line chart&#10;&#10;Description automatically generated">
             <a:extLst>
               <a:ext uri="{FF2B5EF4-FFF2-40B4-BE49-F238E27FC236}">
-                <a16:creationId xmlns:a16="http://schemas.microsoft.com/office/drawing/2014/main" id="{B9327B77-0D5D-4A82-A570-59FAC60AD122}"/>
+                <a16:creationId xmlns:a16="http://schemas.microsoft.com/office/drawing/2014/main" id="{D124382B-2A1F-4F79-98F1-7C1F59EA5C96}"/>
               </a:ext>
             </a:extLst>
           </p:cNvPr>
@@ -6234,7 +6341,7 @@
           </p:cNvPicPr>
           <p:nvPr/>
         </p:nvPicPr>
-        <p:blipFill>
+        <p:blipFill rotWithShape="1">
           <a:blip r:embed="rId2">
             <a:extLst>
               <a:ext uri="{28A0092B-C50C-407E-A947-70E740481C1C}">
@@ -6242,63 +6349,23 @@
               </a:ext>
             </a:extLst>
           </a:blip>
-          <a:stretch>
-            <a:fillRect/>
-          </a:stretch>
+          <a:srcRect l="5376" t="3913" r="7517" b="358"/>
+          <a:stretch/>
         </p:blipFill>
         <p:spPr>
           <a:xfrm>
-            <a:off x="723714" y="1502105"/>
-            <a:ext cx="9392850" cy="4696425"/>
+            <a:off x="609600" y="1390649"/>
+            <a:ext cx="8181789" cy="4495801"/>
           </a:xfrm>
           <a:prstGeom prst="rect">
             <a:avLst/>
           </a:prstGeom>
         </p:spPr>
       </p:pic>
-      <p:sp>
-        <p:nvSpPr>
-          <p:cNvPr id="2" name="TextBox 1">
-            <a:extLst>
-              <a:ext uri="{FF2B5EF4-FFF2-40B4-BE49-F238E27FC236}">
-                <a16:creationId xmlns:a16="http://schemas.microsoft.com/office/drawing/2014/main" id="{9A0CFE86-9847-401E-B73B-B6DCEB6CD40D}"/>
-              </a:ext>
-            </a:extLst>
-          </p:cNvPr>
-          <p:cNvSpPr txBox="1"/>
-          <p:nvPr/>
-        </p:nvSpPr>
-        <p:spPr>
-          <a:xfrm>
-            <a:off x="2968486" y="808383"/>
-            <a:ext cx="4041913" cy="646331"/>
-          </a:xfrm>
-          <a:prstGeom prst="rect">
-            <a:avLst/>
-          </a:prstGeom>
-          <a:noFill/>
-        </p:spPr>
-        <p:txBody>
-          <a:bodyPr wrap="square" rtlCol="0">
-            <a:spAutoFit/>
-          </a:bodyPr>
-          <a:lstStyle/>
-          <a:p>
-            <a:r>
-              <a:rPr lang="en-US" sz="3600" dirty="0">
-                <a:solidFill>
-                  <a:schemeClr val="accent1"/>
-                </a:solidFill>
-              </a:rPr>
-              <a:t>Population Growth </a:t>
-            </a:r>
-          </a:p>
-        </p:txBody>
-      </p:sp>
     </p:spTree>
     <p:extLst>
       <p:ext uri="{BB962C8B-B14F-4D97-AF65-F5344CB8AC3E}">
-        <p14:creationId xmlns:p14="http://schemas.microsoft.com/office/powerpoint/2010/main" val="2811865903"/>
+        <p14:creationId xmlns:p14="http://schemas.microsoft.com/office/powerpoint/2010/main" val="234316892"/>
       </p:ext>
     </p:extLst>
   </p:cSld>
@@ -6330,7 +6397,7 @@
           <p:cNvPr id="2" name="Title 1">
             <a:extLst>
               <a:ext uri="{FF2B5EF4-FFF2-40B4-BE49-F238E27FC236}">
-                <a16:creationId xmlns:a16="http://schemas.microsoft.com/office/drawing/2014/main" id="{1082A037-376A-4D9E-BEC4-576543D8726E}"/>
+                <a16:creationId xmlns:a16="http://schemas.microsoft.com/office/drawing/2014/main" id="{E92B9D07-598B-45D7-B29C-341FB8AA9F38}"/>
               </a:ext>
             </a:extLst>
           </p:cNvPr>
@@ -6343,8 +6410,8 @@
         </p:nvSpPr>
         <p:spPr>
           <a:xfrm>
-            <a:off x="838200" y="365126"/>
-            <a:ext cx="10267604" cy="790344"/>
+            <a:off x="609600" y="609600"/>
+            <a:ext cx="10972800" cy="1188720"/>
           </a:xfrm>
         </p:spPr>
         <p:txBody>
@@ -6354,18 +6421,99 @@
           <a:lstStyle/>
           <a:p>
             <a:r>
-              <a:rPr lang="en-US" sz="3600" dirty="0"/>
-              <a:t>Housing Index vs. Commodities Index</a:t>
+              <a:rPr lang="en-US" sz="4400" dirty="0"/>
+              <a:t>Housing vs. Commodities Index</a:t>
+            </a:r>
+            <a:endParaRPr lang="en-US" sz="4400" dirty="0">
+              <a:solidFill>
+                <a:schemeClr val="accent1"/>
+              </a:solidFill>
+            </a:endParaRPr>
+          </a:p>
+        </p:txBody>
+      </p:sp>
+      <p:sp>
+        <p:nvSpPr>
+          <p:cNvPr id="3" name="Content Placeholder 2">
+            <a:extLst>
+              <a:ext uri="{FF2B5EF4-FFF2-40B4-BE49-F238E27FC236}">
+                <a16:creationId xmlns:a16="http://schemas.microsoft.com/office/drawing/2014/main" id="{8ED9684F-640E-42C2-823B-2923431F4A25}"/>
+              </a:ext>
+            </a:extLst>
+          </p:cNvPr>
+          <p:cNvSpPr>
+            <a:spLocks noGrp="1"/>
+          </p:cNvSpPr>
+          <p:nvPr>
+            <p:ph idx="1"/>
+          </p:nvPr>
+        </p:nvSpPr>
+        <p:spPr>
+          <a:xfrm>
+            <a:off x="609600" y="5422749"/>
+            <a:ext cx="8686800" cy="1397482"/>
+          </a:xfrm>
+        </p:spPr>
+        <p:txBody>
+          <a:bodyPr>
+            <a:normAutofit/>
+          </a:bodyPr>
+          <a:lstStyle/>
+          <a:p>
+            <a:r>
+              <a:rPr lang="en-US" sz="1600" dirty="0"/>
+              <a:t>The housing price changes is not immediate to changes in price fluctuation. In 2008 the housing crisis had minimal effects on the Texas housing market. </a:t>
+            </a:r>
+          </a:p>
+          <a:p>
+            <a:r>
+              <a:rPr lang="en-US" sz="1600" dirty="0"/>
+              <a:t>In 2014, the rate of change of the House Price Index grew.</a:t>
+            </a:r>
+          </a:p>
+        </p:txBody>
+      </p:sp>
+      <p:sp>
+        <p:nvSpPr>
+          <p:cNvPr id="4" name="TextBox 3">
+            <a:extLst>
+              <a:ext uri="{FF2B5EF4-FFF2-40B4-BE49-F238E27FC236}">
+                <a16:creationId xmlns:a16="http://schemas.microsoft.com/office/drawing/2014/main" id="{638C66DA-09F4-4366-A640-2F6FB694F618}"/>
+              </a:ext>
+            </a:extLst>
+          </p:cNvPr>
+          <p:cNvSpPr txBox="1"/>
+          <p:nvPr/>
+        </p:nvSpPr>
+        <p:spPr>
+          <a:xfrm>
+            <a:off x="11353801" y="6042991"/>
+            <a:ext cx="598862" cy="369332"/>
+          </a:xfrm>
+          <a:prstGeom prst="rect">
+            <a:avLst/>
+          </a:prstGeom>
+          <a:noFill/>
+        </p:spPr>
+        <p:txBody>
+          <a:bodyPr wrap="square" rtlCol="0">
+            <a:spAutoFit/>
+          </a:bodyPr>
+          <a:lstStyle/>
+          <a:p>
+            <a:r>
+              <a:rPr lang="en-US" dirty="0"/>
+              <a:t>A-S</a:t>
             </a:r>
           </a:p>
         </p:txBody>
       </p:sp>
       <p:pic>
         <p:nvPicPr>
-          <p:cNvPr id="5" name="Picture 4" descr="A screenshot of a computer&#10;&#10;Description automatically generated with medium confidence">
+          <p:cNvPr id="6" name="Picture 5" descr="A screenshot of a computer&#10;&#10;Description automatically generated with medium confidence">
             <a:extLst>
               <a:ext uri="{FF2B5EF4-FFF2-40B4-BE49-F238E27FC236}">
-                <a16:creationId xmlns:a16="http://schemas.microsoft.com/office/drawing/2014/main" id="{0DF839DB-30CE-4452-A37E-33B67B3562BF}"/>
+                <a16:creationId xmlns:a16="http://schemas.microsoft.com/office/drawing/2014/main" id="{9EACED61-CEC0-4A47-A1FE-9CA0C1486718}"/>
               </a:ext>
             </a:extLst>
           </p:cNvPr>
@@ -6374,7 +6522,7 @@
           </p:cNvPicPr>
           <p:nvPr/>
         </p:nvPicPr>
-        <p:blipFill>
+        <p:blipFill rotWithShape="1">
           <a:blip r:embed="rId2">
             <a:extLst>
               <a:ext uri="{28A0092B-C50C-407E-A947-70E740481C1C}">
@@ -6382,59 +6530,23 @@
               </a:ext>
             </a:extLst>
           </a:blip>
-          <a:stretch>
-            <a:fillRect/>
-          </a:stretch>
+          <a:srcRect l="9901" t="9384" r="9220" b="1122"/>
+          <a:stretch/>
         </p:blipFill>
         <p:spPr>
           <a:xfrm>
-            <a:off x="-1173237" y="760298"/>
-            <a:ext cx="13484507" cy="4991620"/>
+            <a:off x="609600" y="1641323"/>
+            <a:ext cx="9231840" cy="3781426"/>
           </a:xfrm>
           <a:prstGeom prst="rect">
             <a:avLst/>
           </a:prstGeom>
         </p:spPr>
       </p:pic>
-      <p:sp>
-        <p:nvSpPr>
-          <p:cNvPr id="3" name="TextBox 2">
-            <a:extLst>
-              <a:ext uri="{FF2B5EF4-FFF2-40B4-BE49-F238E27FC236}">
-                <a16:creationId xmlns:a16="http://schemas.microsoft.com/office/drawing/2014/main" id="{9131B674-32BF-4C36-96A0-F8BF3B7C0BFD}"/>
-              </a:ext>
-            </a:extLst>
-          </p:cNvPr>
-          <p:cNvSpPr txBox="1"/>
-          <p:nvPr/>
-        </p:nvSpPr>
-        <p:spPr>
-          <a:xfrm>
-            <a:off x="877956" y="5804452"/>
-            <a:ext cx="10638183" cy="646331"/>
-          </a:xfrm>
-          <a:prstGeom prst="rect">
-            <a:avLst/>
-          </a:prstGeom>
-          <a:noFill/>
-        </p:spPr>
-        <p:txBody>
-          <a:bodyPr wrap="square" rtlCol="0">
-            <a:spAutoFit/>
-          </a:bodyPr>
-          <a:lstStyle/>
-          <a:p>
-            <a:r>
-              <a:rPr lang="en-US" dirty="0"/>
-              <a:t>The housing price changes is not immediate to changes in price fluctuation. In 2008 the housing crisis did not affect Texas. We can analyze from the graph the price index started increasing rapidly starting in 2014.</a:t>
-            </a:r>
-          </a:p>
-        </p:txBody>
-      </p:sp>
     </p:spTree>
     <p:extLst>
       <p:ext uri="{BB962C8B-B14F-4D97-AF65-F5344CB8AC3E}">
-        <p14:creationId xmlns:p14="http://schemas.microsoft.com/office/powerpoint/2010/main" val="3366001032"/>
+        <p14:creationId xmlns:p14="http://schemas.microsoft.com/office/powerpoint/2010/main" val="3687796538"/>
       </p:ext>
     </p:extLst>
   </p:cSld>
@@ -6466,7 +6578,7 @@
           <p:cNvPr id="2" name="Title 1">
             <a:extLst>
               <a:ext uri="{FF2B5EF4-FFF2-40B4-BE49-F238E27FC236}">
-                <a16:creationId xmlns:a16="http://schemas.microsoft.com/office/drawing/2014/main" id="{A9E7A970-2CC4-40E2-ADE2-39975E4B5688}"/>
+                <a16:creationId xmlns:a16="http://schemas.microsoft.com/office/drawing/2014/main" id="{E92B9D07-598B-45D7-B29C-341FB8AA9F38}"/>
               </a:ext>
             </a:extLst>
           </p:cNvPr>
@@ -6479,49 +6591,127 @@
         </p:nvSpPr>
         <p:spPr>
           <a:xfrm>
-            <a:off x="887383" y="5735148"/>
-            <a:ext cx="10417233" cy="682279"/>
+            <a:off x="609600" y="609600"/>
+            <a:ext cx="10972800" cy="1188720"/>
           </a:xfrm>
         </p:spPr>
         <p:txBody>
           <a:bodyPr>
-            <a:noAutofit/>
+            <a:normAutofit/>
           </a:bodyPr>
           <a:lstStyle/>
           <a:p>
             <a:r>
-              <a:rPr lang="en-US" sz="1800">
+              <a:rPr lang="en-US" sz="4400" dirty="0">
+                <a:solidFill>
+                  <a:schemeClr val="accent1"/>
+                </a:solidFill>
+              </a:rPr>
+              <a:t>Lumber Price</a:t>
+            </a:r>
+          </a:p>
+        </p:txBody>
+      </p:sp>
+      <p:sp>
+        <p:nvSpPr>
+          <p:cNvPr id="3" name="Content Placeholder 2">
+            <a:extLst>
+              <a:ext uri="{FF2B5EF4-FFF2-40B4-BE49-F238E27FC236}">
+                <a16:creationId xmlns:a16="http://schemas.microsoft.com/office/drawing/2014/main" id="{8ED9684F-640E-42C2-823B-2923431F4A25}"/>
+              </a:ext>
+            </a:extLst>
+          </p:cNvPr>
+          <p:cNvSpPr>
+            <a:spLocks noGrp="1"/>
+          </p:cNvSpPr>
+          <p:nvPr>
+            <p:ph idx="1"/>
+          </p:nvPr>
+        </p:nvSpPr>
+        <p:spPr>
+          <a:xfrm>
+            <a:off x="609600" y="5486399"/>
+            <a:ext cx="8686800" cy="1333831"/>
+          </a:xfrm>
+        </p:spPr>
+        <p:txBody>
+          <a:bodyPr>
+            <a:normAutofit/>
+          </a:bodyPr>
+          <a:lstStyle/>
+          <a:p>
+            <a:r>
+              <a:rPr lang="en-US" sz="1600" dirty="0">
                 <a:solidFill>
                   <a:schemeClr val="tx1"/>
                 </a:solidFill>
               </a:rPr>
-              <a:t>The demonstration shows a drastic change in Lumber prices after April 2020 increasing the price of construction. Predicting if the price of lumber continues to increase, we can expect the price of construction to continue to increase.</a:t>
-            </a:r>
-            <a:endParaRPr lang="en-US" sz="1800" dirty="0">
-              <a:solidFill>
-                <a:schemeClr val="tx1"/>
-              </a:solidFill>
-            </a:endParaRPr>
+              <a:t>The demonstration shows a drastic change in Lumber prices after April 2020.</a:t>
+            </a:r>
+          </a:p>
+          <a:p>
+            <a:r>
+              <a:rPr lang="en-US" sz="1600" dirty="0">
+                <a:solidFill>
+                  <a:schemeClr val="tx1"/>
+                </a:solidFill>
+              </a:rPr>
+              <a:t>If the price of lumber continues to increase, we expect the price of construction to continue to increasing.</a:t>
+            </a:r>
+            <a:endParaRPr lang="en-US" sz="1600" dirty="0"/>
+          </a:p>
+        </p:txBody>
+      </p:sp>
+      <p:sp>
+        <p:nvSpPr>
+          <p:cNvPr id="4" name="TextBox 3">
+            <a:extLst>
+              <a:ext uri="{FF2B5EF4-FFF2-40B4-BE49-F238E27FC236}">
+                <a16:creationId xmlns:a16="http://schemas.microsoft.com/office/drawing/2014/main" id="{638C66DA-09F4-4366-A640-2F6FB694F618}"/>
+              </a:ext>
+            </a:extLst>
+          </p:cNvPr>
+          <p:cNvSpPr txBox="1"/>
+          <p:nvPr/>
+        </p:nvSpPr>
+        <p:spPr>
+          <a:xfrm>
+            <a:off x="11353801" y="6042991"/>
+            <a:ext cx="598862" cy="369332"/>
+          </a:xfrm>
+          <a:prstGeom prst="rect">
+            <a:avLst/>
+          </a:prstGeom>
+          <a:noFill/>
+        </p:spPr>
+        <p:txBody>
+          <a:bodyPr wrap="square" rtlCol="0">
+            <a:spAutoFit/>
+          </a:bodyPr>
+          <a:lstStyle/>
+          <a:p>
+            <a:r>
+              <a:rPr lang="en-US" dirty="0"/>
+              <a:t>A-S</a:t>
+            </a:r>
           </a:p>
         </p:txBody>
       </p:sp>
       <p:pic>
         <p:nvPicPr>
-          <p:cNvPr id="5" name="Content Placeholder 4" descr="A screenshot of a computer&#10;&#10;Description automatically generated with low confidence">
+          <p:cNvPr id="6" name="Content Placeholder 4" descr="A screenshot of a computer&#10;&#10;Description automatically generated with low confidence">
             <a:extLst>
               <a:ext uri="{FF2B5EF4-FFF2-40B4-BE49-F238E27FC236}">
-                <a16:creationId xmlns:a16="http://schemas.microsoft.com/office/drawing/2014/main" id="{2133353D-2A01-47D5-99C9-88534582C318}"/>
+                <a16:creationId xmlns:a16="http://schemas.microsoft.com/office/drawing/2014/main" id="{1434614F-EEA4-479D-9F53-96D54926AFE2}"/>
               </a:ext>
             </a:extLst>
           </p:cNvPr>
           <p:cNvPicPr>
-            <a:picLocks noGrp="1" noChangeAspect="1"/>
+            <a:picLocks noChangeAspect="1"/>
           </p:cNvPicPr>
-          <p:nvPr>
-            <p:ph idx="1"/>
-          </p:nvPr>
+          <p:nvPr/>
         </p:nvPicPr>
-        <p:blipFill>
+        <p:blipFill rotWithShape="1">
           <a:blip r:embed="rId2">
             <a:extLst>
               <a:ext uri="{28A0092B-C50C-407E-A947-70E740481C1C}">
@@ -6529,61 +6719,23 @@
               </a:ext>
             </a:extLst>
           </a:blip>
-          <a:stretch>
-            <a:fillRect/>
-          </a:stretch>
+          <a:srcRect l="9726" t="3800" r="8938" b="-469"/>
+          <a:stretch/>
         </p:blipFill>
         <p:spPr>
           <a:xfrm>
-            <a:off x="-994880" y="593025"/>
-            <a:ext cx="13362007" cy="4946384"/>
-          </a:xfrm>
-        </p:spPr>
-      </p:pic>
-      <p:sp>
-        <p:nvSpPr>
-          <p:cNvPr id="4" name="TextBox 3">
-            <a:extLst>
-              <a:ext uri="{FF2B5EF4-FFF2-40B4-BE49-F238E27FC236}">
-                <a16:creationId xmlns:a16="http://schemas.microsoft.com/office/drawing/2014/main" id="{B05C54D5-F1AF-47A4-ADD9-79A16D732C18}"/>
-              </a:ext>
-            </a:extLst>
-          </p:cNvPr>
-          <p:cNvSpPr txBox="1"/>
-          <p:nvPr/>
-        </p:nvSpPr>
-        <p:spPr>
-          <a:xfrm>
-            <a:off x="317087" y="215077"/>
-            <a:ext cx="3014206" cy="646331"/>
+            <a:off x="609600" y="1038226"/>
+            <a:ext cx="9352565" cy="4114800"/>
           </a:xfrm>
           <a:prstGeom prst="rect">
             <a:avLst/>
           </a:prstGeom>
-          <a:noFill/>
         </p:spPr>
-        <p:txBody>
-          <a:bodyPr wrap="square" rtlCol="0">
-            <a:spAutoFit/>
-          </a:bodyPr>
-          <a:lstStyle/>
-          <a:p>
-            <a:pPr algn="r"/>
-            <a:r>
-              <a:rPr lang="en-US" sz="3600" dirty="0">
-                <a:solidFill>
-                  <a:schemeClr val="accent1"/>
-                </a:solidFill>
-              </a:rPr>
-              <a:t>Lumber Price</a:t>
-            </a:r>
-          </a:p>
-        </p:txBody>
-      </p:sp>
+      </p:pic>
     </p:spTree>
     <p:extLst>
       <p:ext uri="{BB962C8B-B14F-4D97-AF65-F5344CB8AC3E}">
-        <p14:creationId xmlns:p14="http://schemas.microsoft.com/office/powerpoint/2010/main" val="663005220"/>
+        <p14:creationId xmlns:p14="http://schemas.microsoft.com/office/powerpoint/2010/main" val="3288572079"/>
       </p:ext>
     </p:extLst>
   </p:cSld>
@@ -6596,14 +6748,6 @@
 <file path=ppt/slides/slide13.xml><?xml version="1.0" encoding="utf-8"?>
 <p:sld xmlns:a="http://schemas.openxmlformats.org/drawingml/2006/main" xmlns:r="http://schemas.openxmlformats.org/officeDocument/2006/relationships" xmlns:p="http://schemas.openxmlformats.org/presentationml/2006/main">
   <p:cSld>
-    <p:bg>
-      <p:bgPr>
-        <a:solidFill>
-          <a:schemeClr val="bg1"/>
-        </a:solidFill>
-        <a:effectLst/>
-      </p:bgPr>
-    </p:bg>
     <p:spTree>
       <p:nvGrpSpPr>
         <p:cNvPr id="1" name=""/>
@@ -6618,12 +6762,126 @@
           <a:chExt cx="0" cy="0"/>
         </a:xfrm>
       </p:grpSpPr>
+      <p:sp>
+        <p:nvSpPr>
+          <p:cNvPr id="2" name="Title 1">
+            <a:extLst>
+              <a:ext uri="{FF2B5EF4-FFF2-40B4-BE49-F238E27FC236}">
+                <a16:creationId xmlns:a16="http://schemas.microsoft.com/office/drawing/2014/main" id="{E92B9D07-598B-45D7-B29C-341FB8AA9F38}"/>
+              </a:ext>
+            </a:extLst>
+          </p:cNvPr>
+          <p:cNvSpPr>
+            <a:spLocks noGrp="1"/>
+          </p:cNvSpPr>
+          <p:nvPr>
+            <p:ph type="title"/>
+          </p:nvPr>
+        </p:nvSpPr>
+        <p:spPr>
+          <a:xfrm>
+            <a:off x="609600" y="609600"/>
+            <a:ext cx="10972800" cy="1188720"/>
+          </a:xfrm>
+        </p:spPr>
+        <p:txBody>
+          <a:bodyPr>
+            <a:normAutofit/>
+          </a:bodyPr>
+          <a:lstStyle/>
+          <a:p>
+            <a:r>
+              <a:rPr lang="en-US" sz="4400" dirty="0">
+                <a:solidFill>
+                  <a:schemeClr val="accent1"/>
+                </a:solidFill>
+              </a:rPr>
+              <a:t>Price Oil Index vs House Price Index</a:t>
+            </a:r>
+          </a:p>
+        </p:txBody>
+      </p:sp>
+      <p:sp>
+        <p:nvSpPr>
+          <p:cNvPr id="3" name="Content Placeholder 2">
+            <a:extLst>
+              <a:ext uri="{FF2B5EF4-FFF2-40B4-BE49-F238E27FC236}">
+                <a16:creationId xmlns:a16="http://schemas.microsoft.com/office/drawing/2014/main" id="{8ED9684F-640E-42C2-823B-2923431F4A25}"/>
+              </a:ext>
+            </a:extLst>
+          </p:cNvPr>
+          <p:cNvSpPr>
+            <a:spLocks noGrp="1"/>
+          </p:cNvSpPr>
+          <p:nvPr>
+            <p:ph idx="1"/>
+          </p:nvPr>
+        </p:nvSpPr>
+        <p:spPr>
+          <a:xfrm>
+            <a:off x="609600" y="4638674"/>
+            <a:ext cx="8686800" cy="1333831"/>
+          </a:xfrm>
+        </p:spPr>
+        <p:txBody>
+          <a:bodyPr>
+            <a:normAutofit/>
+          </a:bodyPr>
+          <a:lstStyle/>
+          <a:p>
+            <a:pPr>
+              <a:spcAft>
+                <a:spcPts val="600"/>
+              </a:spcAft>
+            </a:pPr>
+            <a:r>
+              <a:rPr lang="en-US" sz="1600" dirty="0"/>
+              <a:t>There is no evident relationship between oil prices and the house price index.</a:t>
+            </a:r>
+          </a:p>
+        </p:txBody>
+      </p:sp>
+      <p:sp>
+        <p:nvSpPr>
+          <p:cNvPr id="4" name="TextBox 3">
+            <a:extLst>
+              <a:ext uri="{FF2B5EF4-FFF2-40B4-BE49-F238E27FC236}">
+                <a16:creationId xmlns:a16="http://schemas.microsoft.com/office/drawing/2014/main" id="{638C66DA-09F4-4366-A640-2F6FB694F618}"/>
+              </a:ext>
+            </a:extLst>
+          </p:cNvPr>
+          <p:cNvSpPr txBox="1"/>
+          <p:nvPr/>
+        </p:nvSpPr>
+        <p:spPr>
+          <a:xfrm>
+            <a:off x="11353801" y="6042991"/>
+            <a:ext cx="598862" cy="369332"/>
+          </a:xfrm>
+          <a:prstGeom prst="rect">
+            <a:avLst/>
+          </a:prstGeom>
+          <a:noFill/>
+        </p:spPr>
+        <p:txBody>
+          <a:bodyPr wrap="square" rtlCol="0">
+            <a:spAutoFit/>
+          </a:bodyPr>
+          <a:lstStyle/>
+          <a:p>
+            <a:r>
+              <a:rPr lang="en-US" dirty="0"/>
+              <a:t>A-S</a:t>
+            </a:r>
+          </a:p>
+        </p:txBody>
+      </p:sp>
       <p:pic>
         <p:nvPicPr>
-          <p:cNvPr id="9" name="Picture 8" descr="A screenshot of a computer&#10;&#10;Description automatically generated with medium confidence">
+          <p:cNvPr id="7" name="Picture 6" descr="A screenshot of a computer&#10;&#10;Description automatically generated with medium confidence">
             <a:extLst>
               <a:ext uri="{FF2B5EF4-FFF2-40B4-BE49-F238E27FC236}">
-                <a16:creationId xmlns:a16="http://schemas.microsoft.com/office/drawing/2014/main" id="{5E0A7EA5-440E-499A-B22E-20F500A9BF5C}"/>
+                <a16:creationId xmlns:a16="http://schemas.microsoft.com/office/drawing/2014/main" id="{3C04963E-7533-4A0F-9C18-0942EB1EBF94}"/>
               </a:ext>
             </a:extLst>
           </p:cNvPr>
@@ -6632,7 +6890,7 @@
           </p:cNvPicPr>
           <p:nvPr/>
         </p:nvPicPr>
-        <p:blipFill>
+        <p:blipFill rotWithShape="1">
           <a:blip r:embed="rId2">
             <a:extLst>
               <a:ext uri="{28A0092B-C50C-407E-A947-70E740481C1C}">
@@ -6640,103 +6898,23 @@
               </a:ext>
             </a:extLst>
           </a:blip>
-          <a:stretch>
-            <a:fillRect/>
-          </a:stretch>
+          <a:srcRect l="9686" r="8448"/>
+          <a:stretch/>
         </p:blipFill>
         <p:spPr>
           <a:xfrm>
-            <a:off x="-682549" y="2054985"/>
-            <a:ext cx="11669638" cy="2598980"/>
+            <a:off x="609600" y="1798320"/>
+            <a:ext cx="9553575" cy="2598980"/>
           </a:xfrm>
           <a:prstGeom prst="rect">
             <a:avLst/>
           </a:prstGeom>
         </p:spPr>
       </p:pic>
-      <p:sp>
-        <p:nvSpPr>
-          <p:cNvPr id="6" name="TextBox 5">
-            <a:extLst>
-              <a:ext uri="{FF2B5EF4-FFF2-40B4-BE49-F238E27FC236}">
-                <a16:creationId xmlns:a16="http://schemas.microsoft.com/office/drawing/2014/main" id="{00C84075-3312-4E1B-AB09-75824C24BAE3}"/>
-              </a:ext>
-            </a:extLst>
-          </p:cNvPr>
-          <p:cNvSpPr txBox="1"/>
-          <p:nvPr/>
-        </p:nvSpPr>
-        <p:spPr>
-          <a:xfrm>
-            <a:off x="1124157" y="5017226"/>
-            <a:ext cx="9011477" cy="369332"/>
-          </a:xfrm>
-          <a:prstGeom prst="rect">
-            <a:avLst/>
-          </a:prstGeom>
-          <a:noFill/>
-        </p:spPr>
-        <p:txBody>
-          <a:bodyPr wrap="square" rtlCol="0">
-            <a:spAutoFit/>
-          </a:bodyPr>
-          <a:lstStyle/>
-          <a:p>
-            <a:pPr>
-              <a:spcAft>
-                <a:spcPts val="600"/>
-              </a:spcAft>
-            </a:pPr>
-            <a:r>
-              <a:rPr lang="en-US"/>
-              <a:t>There is no evident relationship between oil prices and the house price index.</a:t>
-            </a:r>
-          </a:p>
-        </p:txBody>
-      </p:sp>
-      <p:sp>
-        <p:nvSpPr>
-          <p:cNvPr id="13" name="TextBox 12">
-            <a:extLst>
-              <a:ext uri="{FF2B5EF4-FFF2-40B4-BE49-F238E27FC236}">
-                <a16:creationId xmlns:a16="http://schemas.microsoft.com/office/drawing/2014/main" id="{7A122755-AD99-4750-970A-08D5D44BA164}"/>
-              </a:ext>
-            </a:extLst>
-          </p:cNvPr>
-          <p:cNvSpPr txBox="1"/>
-          <p:nvPr/>
-        </p:nvSpPr>
-        <p:spPr>
-          <a:xfrm flipH="1">
-            <a:off x="1304674" y="556592"/>
-            <a:ext cx="8051360" cy="646331"/>
-          </a:xfrm>
-          <a:prstGeom prst="rect">
-            <a:avLst/>
-          </a:prstGeom>
-          <a:noFill/>
-        </p:spPr>
-        <p:txBody>
-          <a:bodyPr wrap="square" rtlCol="0">
-            <a:spAutoFit/>
-          </a:bodyPr>
-          <a:lstStyle/>
-          <a:p>
-            <a:r>
-              <a:rPr lang="en-US" sz="3600" dirty="0">
-                <a:solidFill>
-                  <a:schemeClr val="accent1"/>
-                </a:solidFill>
-              </a:rPr>
-              <a:t>Price Oil Index vs House Price Index</a:t>
-            </a:r>
-          </a:p>
-        </p:txBody>
-      </p:sp>
     </p:spTree>
     <p:extLst>
       <p:ext uri="{BB962C8B-B14F-4D97-AF65-F5344CB8AC3E}">
-        <p14:creationId xmlns:p14="http://schemas.microsoft.com/office/powerpoint/2010/main" val="4275869511"/>
+        <p14:creationId xmlns:p14="http://schemas.microsoft.com/office/powerpoint/2010/main" val="2597594891"/>
       </p:ext>
     </p:extLst>
   </p:cSld>
@@ -6747,16 +6925,8 @@
 </file>
 
 <file path=ppt/slides/slide14.xml><?xml version="1.0" encoding="utf-8"?>
-<p:sld xmlns:a="http://schemas.openxmlformats.org/drawingml/2006/main" xmlns:r="http://schemas.openxmlformats.org/officeDocument/2006/relationships" xmlns:p="http://schemas.openxmlformats.org/presentationml/2006/main" show="0">
+<p:sld xmlns:a="http://schemas.openxmlformats.org/drawingml/2006/main" xmlns:r="http://schemas.openxmlformats.org/officeDocument/2006/relationships" xmlns:p="http://schemas.openxmlformats.org/presentationml/2006/main">
   <p:cSld>
-    <p:bg>
-      <p:bgPr>
-        <a:solidFill>
-          <a:schemeClr val="bg1"/>
-        </a:solidFill>
-        <a:effectLst/>
-      </p:bgPr>
-    </p:bg>
     <p:spTree>
       <p:nvGrpSpPr>
         <p:cNvPr id="1" name=""/>
@@ -6776,7 +6946,7 @@
           <p:cNvPr id="2" name="Title 1">
             <a:extLst>
               <a:ext uri="{FF2B5EF4-FFF2-40B4-BE49-F238E27FC236}">
-                <a16:creationId xmlns:a16="http://schemas.microsoft.com/office/drawing/2014/main" id="{EE27BEEC-4A23-418E-8B50-0FF2D659C49D}"/>
+                <a16:creationId xmlns:a16="http://schemas.microsoft.com/office/drawing/2014/main" id="{8AED9D6C-0C8A-4924-BA13-6C4987AD043B}"/>
               </a:ext>
             </a:extLst>
           </p:cNvPr>
@@ -6789,8 +6959,8 @@
         </p:nvSpPr>
         <p:spPr>
           <a:xfrm>
-            <a:off x="1333502" y="609600"/>
-            <a:ext cx="8596668" cy="1320800"/>
+            <a:off x="609600" y="609600"/>
+            <a:ext cx="10972800" cy="1188720"/>
           </a:xfrm>
         </p:spPr>
         <p:txBody>
@@ -6800,7 +6970,7 @@
           <a:lstStyle/>
           <a:p>
             <a:r>
-              <a:rPr lang="en-US" dirty="0"/>
+              <a:rPr lang="en-US" sz="4400" dirty="0"/>
               <a:t>Postmortem</a:t>
             </a:r>
           </a:p>
@@ -6808,10 +6978,10 @@
       </p:sp>
       <p:sp>
         <p:nvSpPr>
-          <p:cNvPr id="35" name="Content Placeholder 2">
+          <p:cNvPr id="3" name="Content Placeholder 2">
             <a:extLst>
               <a:ext uri="{FF2B5EF4-FFF2-40B4-BE49-F238E27FC236}">
-                <a16:creationId xmlns:a16="http://schemas.microsoft.com/office/drawing/2014/main" id="{1AF1A36F-5BFC-47F8-B576-DC83BFA26378}"/>
+                <a16:creationId xmlns:a16="http://schemas.microsoft.com/office/drawing/2014/main" id="{C3DDB93D-149D-4304-96CB-78CDA77EF966}"/>
               </a:ext>
             </a:extLst>
           </p:cNvPr>
@@ -6824,8 +6994,8 @@
         </p:nvSpPr>
         <p:spPr>
           <a:xfrm>
-            <a:off x="1333502" y="2160590"/>
-            <a:ext cx="8470898" cy="3429260"/>
+            <a:off x="609600" y="1798320"/>
+            <a:ext cx="9144000" cy="3880773"/>
           </a:xfrm>
         </p:spPr>
         <p:txBody>
@@ -6840,45 +7010,48 @@
               </a:lnSpc>
             </a:pPr>
             <a:r>
-              <a:rPr lang="en-US" sz="1500"/>
+              <a:rPr lang="en-US" sz="2000" dirty="0">
+                <a:latin typeface="+mj-lt"/>
+              </a:rPr>
               <a:t>Discuss any difficulties that arose, and how you dealt with them.</a:t>
             </a:r>
           </a:p>
           <a:p>
-            <a:pPr marL="0" indent="0">
+            <a:pPr lvl="1">
               <a:lnSpc>
                 <a:spcPct val="90000"/>
               </a:lnSpc>
-              <a:buNone/>
             </a:pPr>
             <a:r>
-              <a:rPr lang="en-US" sz="1500"/>
-              <a:t>- Housing inventory was only available from 2018 till now. </a:t>
-            </a:r>
-          </a:p>
-          <a:p>
-            <a:pPr>
+              <a:rPr lang="en-US" dirty="0">
+                <a:latin typeface="+mj-lt"/>
+              </a:rPr>
+              <a:t>Housing inventory was only available from 2018-Present. </a:t>
+            </a:r>
+          </a:p>
+          <a:p>
+            <a:pPr lvl="1">
               <a:lnSpc>
                 <a:spcPct val="90000"/>
               </a:lnSpc>
-              <a:buFontTx/>
-              <a:buChar char="-"/>
             </a:pPr>
             <a:r>
-              <a:rPr lang="en-US" sz="1500"/>
+              <a:rPr lang="en-US" dirty="0">
+                <a:latin typeface="+mj-lt"/>
+              </a:rPr>
               <a:t>Most recent census data is from 2020.</a:t>
             </a:r>
           </a:p>
           <a:p>
-            <a:pPr>
+            <a:pPr lvl="1">
               <a:lnSpc>
                 <a:spcPct val="90000"/>
               </a:lnSpc>
-              <a:buFontTx/>
-              <a:buChar char="-"/>
             </a:pPr>
             <a:r>
-              <a:rPr lang="en-US" sz="1500"/>
+              <a:rPr lang="en-US" dirty="0">
+                <a:latin typeface="+mj-lt"/>
+              </a:rPr>
               <a:t>We were not able to determine the cause of the increase of lumber prices therefore we will not be able to determine if they would normalize.</a:t>
             </a:r>
           </a:p>
@@ -6889,111 +7062,117 @@
               </a:lnSpc>
             </a:pPr>
             <a:r>
-              <a:rPr lang="en-US" sz="1500"/>
+              <a:rPr lang="en-US" sz="2000" dirty="0">
+                <a:latin typeface="+mj-lt"/>
+              </a:rPr>
               <a:t>Discuss any additional questions that came up, but which you didn't have time to answer: What would you research next, if you had two more weeks?</a:t>
             </a:r>
           </a:p>
           <a:p>
-            <a:pPr>
+            <a:pPr lvl="1">
               <a:lnSpc>
                 <a:spcPct val="90000"/>
               </a:lnSpc>
-              <a:buFontTx/>
-              <a:buChar char="-"/>
             </a:pPr>
             <a:r>
-              <a:rPr lang="en-US" sz="1500"/>
-              <a:t>We did not find any data analyzing the housing bubble from 2008 compared to the current trend in housing market. </a:t>
-            </a:r>
-          </a:p>
-          <a:p>
-            <a:pPr>
+              <a:rPr lang="en-US" dirty="0">
+                <a:latin typeface="+mj-lt"/>
+              </a:rPr>
+              <a:t>We did not find any data analyzing the housing bubble from 2008 compared to the current trend in housing market.</a:t>
+            </a:r>
+          </a:p>
+          <a:p>
+            <a:pPr lvl="1">
               <a:lnSpc>
                 <a:spcPct val="90000"/>
               </a:lnSpc>
-              <a:buFontTx/>
-              <a:buChar char="-"/>
             </a:pPr>
             <a:r>
-              <a:rPr lang="en-US" sz="1500"/>
-              <a:t> </a:t>
-            </a:r>
-            <a:r>
-              <a:rPr lang="en-US" sz="1500" b="0" i="0">
+              <a:rPr lang="en-US" i="0" dirty="0">
                 <a:effectLst/>
-                <a:latin typeface="-apple-system"/>
+                <a:latin typeface="+mj-lt"/>
               </a:rPr>
               <a:t>Is the current tren</a:t>
             </a:r>
             <a:r>
-              <a:rPr lang="en-US" sz="1500">
-                <a:latin typeface="-apple-system"/>
+              <a:rPr lang="en-US" dirty="0">
+                <a:latin typeface="+mj-lt"/>
               </a:rPr>
               <a:t>d a housing </a:t>
             </a:r>
             <a:r>
-              <a:rPr lang="en-US" sz="1500" b="0" i="0">
+              <a:rPr lang="en-US" i="0" dirty="0">
                 <a:effectLst/>
-                <a:latin typeface="-apple-system"/>
+                <a:latin typeface="+mj-lt"/>
               </a:rPr>
               <a:t>bubble (overinflation of real state prices)? </a:t>
             </a:r>
           </a:p>
           <a:p>
-            <a:pPr>
+            <a:pPr lvl="1">
               <a:lnSpc>
                 <a:spcPct val="90000"/>
               </a:lnSpc>
-              <a:buFontTx/>
-              <a:buChar char="-"/>
             </a:pPr>
             <a:r>
-              <a:rPr lang="en-US" sz="1500" b="0" i="0">
+              <a:rPr lang="en-US" i="0" dirty="0">
                 <a:effectLst/>
-                <a:latin typeface="-apple-system"/>
+                <a:latin typeface="+mj-lt"/>
               </a:rPr>
               <a:t>Analyze supply </a:t>
             </a:r>
             <a:r>
-              <a:rPr lang="en-US" sz="1500">
-                <a:latin typeface="-apple-system"/>
+              <a:rPr lang="en-US" dirty="0">
+                <a:latin typeface="+mj-lt"/>
               </a:rPr>
               <a:t>and demand based on counties, and other states.</a:t>
             </a:r>
-            <a:endParaRPr lang="en-US" sz="1500" b="0" i="0">
+            <a:endParaRPr lang="en-US" i="0" dirty="0">
               <a:effectLst/>
-              <a:latin typeface="-apple-system"/>
+              <a:latin typeface="+mj-lt"/>
             </a:endParaRPr>
           </a:p>
-          <a:p>
-            <a:pPr>
-              <a:lnSpc>
-                <a:spcPct val="90000"/>
-              </a:lnSpc>
-              <a:buFontTx/>
-              <a:buChar char="-"/>
-            </a:pPr>
-            <a:endParaRPr lang="en-US" sz="1500" b="0" i="0">
-              <a:effectLst/>
-              <a:latin typeface="-apple-system"/>
-            </a:endParaRPr>
-          </a:p>
-          <a:p>
-            <a:pPr>
-              <a:lnSpc>
-                <a:spcPct val="90000"/>
-              </a:lnSpc>
-              <a:buFontTx/>
-              <a:buChar char="-"/>
-            </a:pPr>
-            <a:endParaRPr lang="en-US" sz="1500"/>
+        </p:txBody>
+      </p:sp>
+      <p:sp>
+        <p:nvSpPr>
+          <p:cNvPr id="4" name="TextBox 3">
+            <a:extLst>
+              <a:ext uri="{FF2B5EF4-FFF2-40B4-BE49-F238E27FC236}">
+                <a16:creationId xmlns:a16="http://schemas.microsoft.com/office/drawing/2014/main" id="{C2EE1F4C-5369-46E7-8A0E-3F1EDAB15A0B}"/>
+              </a:ext>
+            </a:extLst>
+          </p:cNvPr>
+          <p:cNvSpPr txBox="1"/>
+          <p:nvPr/>
+        </p:nvSpPr>
+        <p:spPr>
+          <a:xfrm>
+            <a:off x="11353801" y="6042991"/>
+            <a:ext cx="598862" cy="369332"/>
+          </a:xfrm>
+          <a:prstGeom prst="rect">
+            <a:avLst/>
+          </a:prstGeom>
+          <a:noFill/>
+        </p:spPr>
+        <p:txBody>
+          <a:bodyPr wrap="square" rtlCol="0">
+            <a:spAutoFit/>
+          </a:bodyPr>
+          <a:lstStyle/>
+          <a:p>
+            <a:r>
+              <a:rPr lang="en-US" dirty="0"/>
+              <a:t>A-S</a:t>
+            </a:r>
           </a:p>
         </p:txBody>
       </p:sp>
     </p:spTree>
     <p:extLst>
       <p:ext uri="{BB962C8B-B14F-4D97-AF65-F5344CB8AC3E}">
-        <p14:creationId xmlns:p14="http://schemas.microsoft.com/office/powerpoint/2010/main" val="841833914"/>
+        <p14:creationId xmlns:p14="http://schemas.microsoft.com/office/powerpoint/2010/main" val="3136202196"/>
       </p:ext>
     </p:extLst>
   </p:cSld>
@@ -7176,8 +7355,8 @@
         </p:nvSpPr>
         <p:spPr>
           <a:xfrm>
-            <a:off x="1333502" y="609600"/>
-            <a:ext cx="8596668" cy="1320800"/>
+            <a:off x="609600" y="639499"/>
+            <a:ext cx="10972800" cy="1188720"/>
           </a:xfrm>
         </p:spPr>
         <p:txBody>
@@ -7187,7 +7366,7 @@
           <a:lstStyle/>
           <a:p>
             <a:r>
-              <a:rPr lang="en-US"/>
+              <a:rPr lang="en-US" sz="4400" dirty="0"/>
               <a:t>Description &amp; Scope</a:t>
             </a:r>
           </a:p>
@@ -7211,63 +7390,33 @@
         </p:nvSpPr>
         <p:spPr>
           <a:xfrm>
-            <a:off x="1333502" y="2160590"/>
-            <a:ext cx="8470898" cy="3429260"/>
+            <a:off x="609600" y="1828219"/>
+            <a:ext cx="9144000" cy="3429260"/>
           </a:xfrm>
         </p:spPr>
         <p:txBody>
           <a:bodyPr>
-            <a:normAutofit lnSpcReduction="10000"/>
+            <a:normAutofit/>
           </a:bodyPr>
           <a:lstStyle/>
           <a:p>
-            <a:pPr marL="0" indent="0">
-              <a:buNone/>
-            </a:pPr>
-            <a:r>
-              <a:rPr lang="en-US" sz="2400" dirty="0">
+            <a:r>
+              <a:rPr lang="en-US" sz="2600" dirty="0">
                 <a:solidFill>
                   <a:schemeClr val="tx1"/>
                 </a:solidFill>
               </a:rPr>
-              <a:t>The goal of the project is to perform an analysis of the housing market in </a:t>
-            </a:r>
-            <a:r>
-              <a:rPr lang="en-US" sz="2400" b="1" dirty="0">
+              <a:t>The goal of this project is to perform an analysis of the housing market in Texas and evaluate factors that influence the current market trends.</a:t>
+            </a:r>
+          </a:p>
+          <a:p>
+            <a:r>
+              <a:rPr lang="en-US" sz="2600" dirty="0">
                 <a:solidFill>
                   <a:schemeClr val="tx1"/>
                 </a:solidFill>
               </a:rPr>
-              <a:t>Texas</a:t>
-            </a:r>
-            <a:r>
-              <a:rPr lang="en-US" sz="2400" dirty="0">
-                <a:solidFill>
-                  <a:schemeClr val="tx1"/>
-                </a:solidFill>
-              </a:rPr>
-              <a:t> and try to evaluate factors that may be potentially influencing the current trend. </a:t>
-            </a:r>
-            <a:endParaRPr lang="en-US" sz="2400" dirty="0">
-              <a:solidFill>
-                <a:schemeClr val="tx1"/>
-              </a:solidFill>
-              <a:highlight>
-                <a:srgbClr val="FFFF00"/>
-              </a:highlight>
-            </a:endParaRPr>
-          </a:p>
-          <a:p>
-            <a:pPr marL="0" indent="0">
-              <a:buNone/>
-            </a:pPr>
-            <a:r>
-              <a:rPr lang="en-US" sz="2400" dirty="0">
-                <a:solidFill>
-                  <a:schemeClr val="tx1"/>
-                </a:solidFill>
-              </a:rPr>
-              <a:t>Gather real state inventory data and pricing data for real state, Oil, lumber, copper, etc. To analyze supply demand influences, job market and construction costs. Use the data to evaluate the trends for each, compare it to the housing price trends and determine if there are significant correlations. </a:t>
+              <a:t>For this project, we gathered housing prices, active inventories, population, prices for oil (WTI), lumber, iron and copper in order to analyze supply and demand for homes and compare the prices against the cost of construction</a:t>
             </a:r>
           </a:p>
           <a:p>
@@ -7346,37 +7495,21 @@
             <p:ph type="title"/>
           </p:nvPr>
         </p:nvSpPr>
-        <p:spPr/>
+        <p:spPr>
+          <a:xfrm>
+            <a:off x="609600" y="609600"/>
+            <a:ext cx="10972800" cy="1188720"/>
+          </a:xfrm>
+        </p:spPr>
         <p:txBody>
           <a:bodyPr>
-            <a:normAutofit fontScale="90000"/>
+            <a:normAutofit/>
           </a:bodyPr>
           <a:lstStyle/>
           <a:p>
             <a:r>
               <a:rPr lang="en-US" sz="4400" dirty="0"/>
               <a:t>Questions</a:t>
-            </a:r>
-            <a:r>
-              <a:rPr lang="en-US" dirty="0"/>
-              <a:t> </a:t>
-            </a:r>
-            <a:r>
-              <a:rPr lang="en-US" sz="4400" dirty="0">
-                <a:solidFill>
-                  <a:schemeClr val="tx1"/>
-                </a:solidFill>
-              </a:rPr>
-              <a:t>(W</a:t>
-            </a:r>
-            <a:r>
-              <a:rPr lang="en-US" sz="4400" b="0" i="0" dirty="0">
-                <a:solidFill>
-                  <a:schemeClr val="tx1"/>
-                </a:solidFill>
-                <a:effectLst/>
-              </a:rPr>
-              <a:t>hat is triggering rise in prices?)</a:t>
             </a:r>
             <a:endParaRPr lang="en-US" dirty="0">
               <a:solidFill>
@@ -7402,7 +7535,12 @@
             <p:ph idx="1"/>
           </p:nvPr>
         </p:nvSpPr>
-        <p:spPr/>
+        <p:spPr>
+          <a:xfrm>
+            <a:off x="609600" y="1798320"/>
+            <a:ext cx="9144000" cy="3880773"/>
+          </a:xfrm>
+        </p:spPr>
         <p:txBody>
           <a:bodyPr>
             <a:normAutofit/>
@@ -7416,7 +7554,18 @@
                 </a:solidFill>
                 <a:effectLst/>
               </a:rPr>
-              <a:t>What is the relation between population growth and number of house inventory? </a:t>
+              <a:t>What is triggering the rise in housing prices?</a:t>
+            </a:r>
+          </a:p>
+          <a:p>
+            <a:r>
+              <a:rPr lang="en-US" sz="2600" b="0" i="0" dirty="0">
+                <a:solidFill>
+                  <a:schemeClr val="tx1"/>
+                </a:solidFill>
+                <a:effectLst/>
+              </a:rPr>
+              <a:t>What is the relation between population growth and housing inventory? </a:t>
             </a:r>
           </a:p>
           <a:p>
@@ -7438,11 +7587,8 @@
                 </a:solidFill>
                 <a:effectLst/>
               </a:rPr>
-              <a:t>Do oil prices influence demands for homes? </a:t>
-            </a:r>
-          </a:p>
-          <a:p>
-            <a:endParaRPr lang="en-US" sz="3600" dirty="0"/>
+              <a:t>Does oil prices influence demand for homes? </a:t>
+            </a:r>
           </a:p>
         </p:txBody>
       </p:sp>
@@ -7492,13 +7638,20 @@
             <p:ph type="title"/>
           </p:nvPr>
         </p:nvSpPr>
-        <p:spPr/>
-        <p:txBody>
-          <a:bodyPr/>
-          <a:lstStyle/>
-          <a:p>
-            <a:r>
-              <a:rPr lang="en-US" dirty="0"/>
+        <p:spPr>
+          <a:xfrm>
+            <a:off x="609600" y="609600"/>
+            <a:ext cx="10972800" cy="1188720"/>
+          </a:xfrm>
+        </p:spPr>
+        <p:txBody>
+          <a:bodyPr>
+            <a:normAutofit/>
+          </a:bodyPr>
+          <a:lstStyle/>
+          <a:p>
+            <a:r>
+              <a:rPr lang="en-US" sz="4400" dirty="0"/>
               <a:t>Data Resources</a:t>
             </a:r>
           </a:p>
@@ -7520,7 +7673,12 @@
             <p:ph idx="1"/>
           </p:nvPr>
         </p:nvSpPr>
-        <p:spPr/>
+        <p:spPr>
+          <a:xfrm>
+            <a:off x="609600" y="1798320"/>
+            <a:ext cx="9144000" cy="3880773"/>
+          </a:xfrm>
+        </p:spPr>
         <p:txBody>
           <a:bodyPr>
             <a:normAutofit/>
@@ -7528,7 +7686,7 @@
           <a:lstStyle/>
           <a:p>
             <a:r>
-              <a:rPr lang="en-US" dirty="0">
+              <a:rPr lang="en-US" sz="2400" b="1" dirty="0">
                 <a:solidFill>
                   <a:schemeClr val="tx1"/>
                 </a:solidFill>
@@ -7537,33 +7695,36 @@
               <a:t>FRED Economic Research</a:t>
             </a:r>
             <a:r>
-              <a:rPr lang="en-US" dirty="0">
+              <a:rPr lang="en-US" sz="2400" b="1" dirty="0">
                 <a:latin typeface="+mj-lt"/>
               </a:rPr>
-              <a:t> (</a:t>
-            </a:r>
-            <a:r>
-              <a:rPr lang="en-US" dirty="0">
+              <a:t> </a:t>
+            </a:r>
+            <a:r>
+              <a:rPr lang="en-US" sz="2400" dirty="0">
+                <a:latin typeface="+mj-lt"/>
+              </a:rPr>
+              <a:t>(</a:t>
+            </a:r>
+            <a:r>
+              <a:rPr lang="en-US" sz="2400" dirty="0">
                 <a:latin typeface="+mj-lt"/>
                 <a:hlinkClick r:id="rId2"/>
               </a:rPr>
               <a:t>https://fred.stlouisfed.org/</a:t>
             </a:r>
             <a:r>
-              <a:rPr lang="en-US" dirty="0">
+              <a:rPr lang="en-US" sz="2400" dirty="0">
                 <a:latin typeface="+mj-lt"/>
               </a:rPr>
               <a:t>). </a:t>
             </a:r>
-            <a:r>
-              <a:rPr lang="en-US" dirty="0">
-                <a:solidFill>
-                  <a:schemeClr val="tx1"/>
-                </a:solidFill>
-                <a:latin typeface="+mj-lt"/>
-              </a:rPr>
-              <a:t>Used data from 1995 to 2021</a:t>
-            </a:r>
+            <a:endParaRPr lang="en-US" sz="2400" dirty="0">
+              <a:solidFill>
+                <a:schemeClr val="tx1"/>
+              </a:solidFill>
+              <a:latin typeface="+mj-lt"/>
+            </a:endParaRPr>
           </a:p>
           <a:p>
             <a:pPr lvl="1"/>
@@ -7639,7 +7800,7 @@
           </a:p>
           <a:p>
             <a:r>
-              <a:rPr lang="en-US" b="1" i="0" dirty="0">
+              <a:rPr lang="en-US" sz="2400" b="1" i="0" dirty="0">
                 <a:solidFill>
                   <a:schemeClr val="tx1"/>
                 </a:solidFill>
@@ -7649,7 +7810,7 @@
               <a:t>Zillow Housing Dat</a:t>
             </a:r>
             <a:r>
-              <a:rPr lang="en-US" b="1" dirty="0">
+              <a:rPr lang="en-US" sz="2400" b="1" dirty="0">
                 <a:solidFill>
                   <a:schemeClr val="tx1"/>
                 </a:solidFill>
@@ -7658,20 +7819,20 @@
               <a:t>a </a:t>
             </a:r>
             <a:r>
-              <a:rPr lang="en-US" dirty="0">
+              <a:rPr lang="en-US" sz="2400" dirty="0">
                 <a:latin typeface="+mj-lt"/>
               </a:rPr>
               <a:t>(</a:t>
             </a:r>
             <a:r>
-              <a:rPr lang="en-US" dirty="0">
+              <a:rPr lang="en-US" sz="2400" dirty="0">
                 <a:latin typeface="+mj-lt"/>
                 <a:hlinkClick r:id="rId3"/>
               </a:rPr>
               <a:t>Housing Data - Zillow Research</a:t>
             </a:r>
             <a:r>
-              <a:rPr lang="en-US" dirty="0">
+              <a:rPr lang="en-US" sz="2400" dirty="0">
                 <a:latin typeface="+mj-lt"/>
               </a:rPr>
               <a:t>)</a:t>
@@ -7773,13 +7934,20 @@
             <p:ph type="title"/>
           </p:nvPr>
         </p:nvSpPr>
-        <p:spPr/>
-        <p:txBody>
-          <a:bodyPr/>
-          <a:lstStyle/>
-          <a:p>
-            <a:r>
-              <a:rPr lang="en-US" dirty="0"/>
+        <p:spPr>
+          <a:xfrm>
+            <a:off x="609600" y="609600"/>
+            <a:ext cx="10972800" cy="1188720"/>
+          </a:xfrm>
+        </p:spPr>
+        <p:txBody>
+          <a:bodyPr>
+            <a:normAutofit/>
+          </a:bodyPr>
+          <a:lstStyle/>
+          <a:p>
+            <a:r>
+              <a:rPr lang="en-US" sz="4400" dirty="0"/>
               <a:t>Data Exploration and Clean Up </a:t>
             </a:r>
           </a:p>
@@ -7801,13 +7969,20 @@
             <p:ph idx="1"/>
           </p:nvPr>
         </p:nvSpPr>
-        <p:spPr/>
-        <p:txBody>
-          <a:bodyPr/>
-          <a:lstStyle/>
-          <a:p>
-            <a:r>
-              <a:rPr lang="en-US" i="1" dirty="0">
+        <p:spPr>
+          <a:xfrm>
+            <a:off x="609600" y="1798320"/>
+            <a:ext cx="9144000" cy="3880773"/>
+          </a:xfrm>
+        </p:spPr>
+        <p:txBody>
+          <a:bodyPr>
+            <a:normAutofit/>
+          </a:bodyPr>
+          <a:lstStyle/>
+          <a:p>
+            <a:r>
+              <a:rPr lang="en-US" sz="2600" dirty="0">
                 <a:solidFill>
                   <a:schemeClr val="tx1"/>
                 </a:solidFill>
@@ -7817,7 +7992,7 @@
           </a:p>
           <a:p>
             <a:r>
-              <a:rPr lang="en-US" i="1" dirty="0">
+              <a:rPr lang="en-US" sz="2600" dirty="0">
                 <a:solidFill>
                   <a:schemeClr val="tx1"/>
                 </a:solidFill>
@@ -7827,7 +8002,7 @@
           </a:p>
           <a:p>
             <a:r>
-              <a:rPr lang="en-US" i="1" dirty="0">
+              <a:rPr lang="en-US" sz="2600" dirty="0">
                 <a:solidFill>
                   <a:schemeClr val="tx1"/>
                 </a:solidFill>
@@ -7837,7 +8012,7 @@
           </a:p>
           <a:p>
             <a:r>
-              <a:rPr lang="en-US" i="1" dirty="0">
+              <a:rPr lang="en-US" sz="2600" dirty="0">
                 <a:solidFill>
                   <a:schemeClr val="tx1"/>
                 </a:solidFill>
@@ -7928,13 +8103,20 @@
             <p:ph type="title"/>
           </p:nvPr>
         </p:nvSpPr>
-        <p:spPr/>
-        <p:txBody>
-          <a:bodyPr/>
-          <a:lstStyle/>
-          <a:p>
-            <a:r>
-              <a:rPr lang="en-US" dirty="0"/>
+        <p:spPr>
+          <a:xfrm>
+            <a:off x="609600" y="609600"/>
+            <a:ext cx="10972800" cy="1188720"/>
+          </a:xfrm>
+        </p:spPr>
+        <p:txBody>
+          <a:bodyPr>
+            <a:normAutofit/>
+          </a:bodyPr>
+          <a:lstStyle/>
+          <a:p>
+            <a:r>
+              <a:rPr lang="en-US" sz="4400" dirty="0"/>
               <a:t>Analysis Process</a:t>
             </a:r>
           </a:p>
@@ -7958,16 +8140,18 @@
         </p:nvSpPr>
         <p:spPr>
           <a:xfrm>
-            <a:off x="783352" y="1930400"/>
-            <a:ext cx="8596668" cy="3880773"/>
+            <a:off x="609600" y="1798320"/>
+            <a:ext cx="9144000" cy="3880773"/>
           </a:xfrm>
         </p:spPr>
         <p:txBody>
-          <a:bodyPr/>
-          <a:lstStyle/>
-          <a:p>
-            <a:r>
-              <a:rPr lang="en-US" i="1" dirty="0">
+          <a:bodyPr>
+            <a:normAutofit/>
+          </a:bodyPr>
+          <a:lstStyle/>
+          <a:p>
+            <a:r>
+              <a:rPr lang="en-US" sz="2600" dirty="0">
                 <a:solidFill>
                   <a:schemeClr val="tx1"/>
                 </a:solidFill>
@@ -7977,7 +8161,7 @@
           </a:p>
           <a:p>
             <a:r>
-              <a:rPr lang="en-US" i="1" dirty="0">
+              <a:rPr lang="en-US" sz="2600" dirty="0">
                 <a:solidFill>
                   <a:schemeClr val="tx1"/>
                 </a:solidFill>
@@ -8117,116 +8301,160 @@
           <a:chExt cx="0" cy="0"/>
         </a:xfrm>
       </p:grpSpPr>
+      <p:sp>
+        <p:nvSpPr>
+          <p:cNvPr id="2" name="Title 1">
+            <a:extLst>
+              <a:ext uri="{FF2B5EF4-FFF2-40B4-BE49-F238E27FC236}">
+                <a16:creationId xmlns:a16="http://schemas.microsoft.com/office/drawing/2014/main" id="{E92B9D07-598B-45D7-B29C-341FB8AA9F38}"/>
+              </a:ext>
+            </a:extLst>
+          </p:cNvPr>
+          <p:cNvSpPr>
+            <a:spLocks noGrp="1"/>
+          </p:cNvSpPr>
+          <p:nvPr>
+            <p:ph type="title"/>
+          </p:nvPr>
+        </p:nvSpPr>
+        <p:spPr>
+          <a:xfrm>
+            <a:off x="609600" y="609600"/>
+            <a:ext cx="10972800" cy="1188720"/>
+          </a:xfrm>
+        </p:spPr>
+        <p:txBody>
+          <a:bodyPr>
+            <a:normAutofit/>
+          </a:bodyPr>
+          <a:lstStyle/>
+          <a:p>
+            <a:r>
+              <a:rPr lang="en-US" sz="4400" dirty="0">
+                <a:solidFill>
+                  <a:schemeClr val="accent1"/>
+                </a:solidFill>
+              </a:rPr>
+              <a:t>Home Values</a:t>
+            </a:r>
+          </a:p>
+        </p:txBody>
+      </p:sp>
+      <p:sp>
+        <p:nvSpPr>
+          <p:cNvPr id="3" name="Content Placeholder 2">
+            <a:extLst>
+              <a:ext uri="{FF2B5EF4-FFF2-40B4-BE49-F238E27FC236}">
+                <a16:creationId xmlns:a16="http://schemas.microsoft.com/office/drawing/2014/main" id="{8ED9684F-640E-42C2-823B-2923431F4A25}"/>
+              </a:ext>
+            </a:extLst>
+          </p:cNvPr>
+          <p:cNvSpPr>
+            <a:spLocks noGrp="1"/>
+          </p:cNvSpPr>
+          <p:nvPr>
+            <p:ph idx="1"/>
+          </p:nvPr>
+        </p:nvSpPr>
+        <p:spPr>
+          <a:xfrm>
+            <a:off x="609600" y="5265751"/>
+            <a:ext cx="8686800" cy="1554480"/>
+          </a:xfrm>
+        </p:spPr>
+        <p:txBody>
+          <a:bodyPr>
+            <a:normAutofit lnSpcReduction="10000"/>
+          </a:bodyPr>
+          <a:lstStyle/>
+          <a:p>
+            <a:r>
+              <a:rPr lang="en-US" sz="1600" dirty="0"/>
+              <a:t>Texas metropolitan areas are experiencing an increase in home values.</a:t>
+            </a:r>
+          </a:p>
+          <a:p>
+            <a:r>
+              <a:rPr lang="en-US" sz="1600" dirty="0"/>
+              <a:t>Austin shows to have higher home values and price increase compared to other metropolitan areas in Texas.</a:t>
+            </a:r>
+          </a:p>
+          <a:p>
+            <a:r>
+              <a:rPr lang="en-US" sz="1600" dirty="0"/>
+              <a:t>McAllen has the lowest prices and although they are increasing, they seem to be at a steady pace compared to other metropolitan areas.</a:t>
+            </a:r>
+          </a:p>
+        </p:txBody>
+      </p:sp>
+      <p:sp>
+        <p:nvSpPr>
+          <p:cNvPr id="4" name="TextBox 3">
+            <a:extLst>
+              <a:ext uri="{FF2B5EF4-FFF2-40B4-BE49-F238E27FC236}">
+                <a16:creationId xmlns:a16="http://schemas.microsoft.com/office/drawing/2014/main" id="{638C66DA-09F4-4366-A640-2F6FB694F618}"/>
+              </a:ext>
+            </a:extLst>
+          </p:cNvPr>
+          <p:cNvSpPr txBox="1"/>
+          <p:nvPr/>
+        </p:nvSpPr>
+        <p:spPr>
+          <a:xfrm>
+            <a:off x="11353801" y="6042991"/>
+            <a:ext cx="598862" cy="369332"/>
+          </a:xfrm>
+          <a:prstGeom prst="rect">
+            <a:avLst/>
+          </a:prstGeom>
+          <a:noFill/>
+        </p:spPr>
+        <p:txBody>
+          <a:bodyPr wrap="square" rtlCol="0">
+            <a:spAutoFit/>
+          </a:bodyPr>
+          <a:lstStyle/>
+          <a:p>
+            <a:r>
+              <a:rPr lang="en-US" dirty="0"/>
+              <a:t>A-S</a:t>
+            </a:r>
+          </a:p>
+        </p:txBody>
+      </p:sp>
       <p:pic>
         <p:nvPicPr>
-          <p:cNvPr id="8" name="Content Placeholder 7">
+          <p:cNvPr id="5" name="Content Placeholder 7">
             <a:extLst>
               <a:ext uri="{FF2B5EF4-FFF2-40B4-BE49-F238E27FC236}">
-                <a16:creationId xmlns:a16="http://schemas.microsoft.com/office/drawing/2014/main" id="{4C0B4A25-69AE-42B7-B834-A21A68396E41}"/>
+                <a16:creationId xmlns:a16="http://schemas.microsoft.com/office/drawing/2014/main" id="{D1E56DBF-8864-4F75-A21D-D153FC29899D}"/>
               </a:ext>
             </a:extLst>
           </p:cNvPr>
           <p:cNvPicPr>
-            <a:picLocks noGrp="1" noChangeAspect="1"/>
+            <a:picLocks noChangeAspect="1"/>
           </p:cNvPicPr>
-          <p:nvPr>
-            <p:ph idx="1"/>
-          </p:nvPr>
+          <p:nvPr/>
         </p:nvPicPr>
-        <p:blipFill>
+        <p:blipFill rotWithShape="1">
           <a:blip r:embed="rId2"/>
-          <a:stretch>
-            <a:fillRect/>
-          </a:stretch>
+          <a:srcRect l="8822" t="8106" r="8452" b="5506"/>
+          <a:stretch/>
         </p:blipFill>
         <p:spPr>
           <a:xfrm>
-            <a:off x="-560319" y="266521"/>
-            <a:ext cx="12181637" cy="5290534"/>
+            <a:off x="609600" y="1246823"/>
+            <a:ext cx="8905875" cy="4039082"/>
           </a:xfrm>
           <a:prstGeom prst="rect">
             <a:avLst/>
           </a:prstGeom>
         </p:spPr>
       </p:pic>
-      <p:sp>
-        <p:nvSpPr>
-          <p:cNvPr id="11" name="TextBox 10">
-            <a:extLst>
-              <a:ext uri="{FF2B5EF4-FFF2-40B4-BE49-F238E27FC236}">
-                <a16:creationId xmlns:a16="http://schemas.microsoft.com/office/drawing/2014/main" id="{E19EC3CD-AADF-4CCA-9D65-53F603C2442F}"/>
-              </a:ext>
-            </a:extLst>
-          </p:cNvPr>
-          <p:cNvSpPr txBox="1"/>
-          <p:nvPr/>
-        </p:nvSpPr>
-        <p:spPr>
-          <a:xfrm>
-            <a:off x="923925" y="5391150"/>
-            <a:ext cx="10239375" cy="1200329"/>
-          </a:xfrm>
-          <a:prstGeom prst="rect">
-            <a:avLst/>
-          </a:prstGeom>
-          <a:noFill/>
-        </p:spPr>
-        <p:txBody>
-          <a:bodyPr wrap="square" rtlCol="0">
-            <a:spAutoFit/>
-          </a:bodyPr>
-          <a:lstStyle/>
-          <a:p>
-            <a:r>
-              <a:rPr lang="en-US" dirty="0"/>
-              <a:t>Texas metropolitan areas are experiencing an increase in home values. Austin shows to have higher home values compared to other Texas cities. It also shows to have the most significant increase in prices, followed by Dallas. McAllen on the other hand has the lowest valued homes and although the price values are increasing, it seems to be at a steady pace relative to the rest of the state.  </a:t>
-            </a:r>
-          </a:p>
-        </p:txBody>
-      </p:sp>
-      <p:sp>
-        <p:nvSpPr>
-          <p:cNvPr id="3" name="TextBox 2">
-            <a:extLst>
-              <a:ext uri="{FF2B5EF4-FFF2-40B4-BE49-F238E27FC236}">
-                <a16:creationId xmlns:a16="http://schemas.microsoft.com/office/drawing/2014/main" id="{57DA4F03-F542-4238-86DE-47947672328B}"/>
-              </a:ext>
-            </a:extLst>
-          </p:cNvPr>
-          <p:cNvSpPr txBox="1"/>
-          <p:nvPr/>
-        </p:nvSpPr>
-        <p:spPr>
-          <a:xfrm>
-            <a:off x="1709530" y="100616"/>
-            <a:ext cx="4837044" cy="646331"/>
-          </a:xfrm>
-          <a:prstGeom prst="rect">
-            <a:avLst/>
-          </a:prstGeom>
-          <a:noFill/>
-        </p:spPr>
-        <p:txBody>
-          <a:bodyPr wrap="square" rtlCol="0">
-            <a:spAutoFit/>
-          </a:bodyPr>
-          <a:lstStyle/>
-          <a:p>
-            <a:r>
-              <a:rPr lang="en-US" sz="3600" dirty="0">
-                <a:solidFill>
-                  <a:schemeClr val="accent1"/>
-                </a:solidFill>
-              </a:rPr>
-              <a:t>Home Values</a:t>
-            </a:r>
-          </a:p>
-        </p:txBody>
-      </p:sp>
     </p:spTree>
     <p:extLst>
       <p:ext uri="{BB962C8B-B14F-4D97-AF65-F5344CB8AC3E}">
-        <p14:creationId xmlns:p14="http://schemas.microsoft.com/office/powerpoint/2010/main" val="2763816985"/>
+        <p14:creationId xmlns:p14="http://schemas.microsoft.com/office/powerpoint/2010/main" val="962365998"/>
       </p:ext>
     </p:extLst>
   </p:cSld>
@@ -8258,7 +8486,7 @@
           <p:cNvPr id="2" name="Title 1">
             <a:extLst>
               <a:ext uri="{FF2B5EF4-FFF2-40B4-BE49-F238E27FC236}">
-                <a16:creationId xmlns:a16="http://schemas.microsoft.com/office/drawing/2014/main" id="{ACD0F276-B0D6-451A-A47A-76D0F57D2649}"/>
+                <a16:creationId xmlns:a16="http://schemas.microsoft.com/office/drawing/2014/main" id="{E92B9D07-598B-45D7-B29C-341FB8AA9F38}"/>
               </a:ext>
             </a:extLst>
           </p:cNvPr>
@@ -8269,7 +8497,12 @@
             <p:ph type="title"/>
           </p:nvPr>
         </p:nvSpPr>
-        <p:spPr/>
+        <p:spPr>
+          <a:xfrm>
+            <a:off x="609600" y="609600"/>
+            <a:ext cx="10972800" cy="1188720"/>
+          </a:xfrm>
+        </p:spPr>
         <p:txBody>
           <a:bodyPr>
             <a:normAutofit/>
@@ -8277,29 +8510,108 @@
           <a:lstStyle/>
           <a:p>
             <a:r>
-              <a:rPr lang="en-US" sz="3600" dirty="0"/>
+              <a:rPr lang="en-US" sz="4400" dirty="0"/>
               <a:t>Listing Inventory</a:t>
+            </a:r>
+            <a:endParaRPr lang="en-US" sz="4400" dirty="0">
+              <a:solidFill>
+                <a:schemeClr val="accent1"/>
+              </a:solidFill>
+            </a:endParaRPr>
+          </a:p>
+        </p:txBody>
+      </p:sp>
+      <p:sp>
+        <p:nvSpPr>
+          <p:cNvPr id="3" name="Content Placeholder 2">
+            <a:extLst>
+              <a:ext uri="{FF2B5EF4-FFF2-40B4-BE49-F238E27FC236}">
+                <a16:creationId xmlns:a16="http://schemas.microsoft.com/office/drawing/2014/main" id="{8ED9684F-640E-42C2-823B-2923431F4A25}"/>
+              </a:ext>
+            </a:extLst>
+          </p:cNvPr>
+          <p:cNvSpPr>
+            <a:spLocks noGrp="1"/>
+          </p:cNvSpPr>
+          <p:nvPr>
+            <p:ph idx="1"/>
+          </p:nvPr>
+        </p:nvSpPr>
+        <p:spPr>
+          <a:xfrm>
+            <a:off x="609600" y="4961102"/>
+            <a:ext cx="8686800" cy="1896898"/>
+          </a:xfrm>
+        </p:spPr>
+        <p:txBody>
+          <a:bodyPr>
+            <a:normAutofit/>
+          </a:bodyPr>
+          <a:lstStyle/>
+          <a:p>
+            <a:r>
+              <a:rPr lang="en-US" sz="2000" dirty="0"/>
+              <a:t>Listing inventories reflect a seasonality in home sales.</a:t>
+            </a:r>
+          </a:p>
+          <a:p>
+            <a:r>
+              <a:rPr lang="en-US" sz="2000" dirty="0"/>
+              <a:t>Inventories for 2020 decreased when compared to the same period for 2018 and 2019</a:t>
+            </a:r>
+          </a:p>
+        </p:txBody>
+      </p:sp>
+      <p:sp>
+        <p:nvSpPr>
+          <p:cNvPr id="4" name="TextBox 3">
+            <a:extLst>
+              <a:ext uri="{FF2B5EF4-FFF2-40B4-BE49-F238E27FC236}">
+                <a16:creationId xmlns:a16="http://schemas.microsoft.com/office/drawing/2014/main" id="{638C66DA-09F4-4366-A640-2F6FB694F618}"/>
+              </a:ext>
+            </a:extLst>
+          </p:cNvPr>
+          <p:cNvSpPr txBox="1"/>
+          <p:nvPr/>
+        </p:nvSpPr>
+        <p:spPr>
+          <a:xfrm>
+            <a:off x="11353801" y="6042991"/>
+            <a:ext cx="598862" cy="369332"/>
+          </a:xfrm>
+          <a:prstGeom prst="rect">
+            <a:avLst/>
+          </a:prstGeom>
+          <a:noFill/>
+        </p:spPr>
+        <p:txBody>
+          <a:bodyPr wrap="square" rtlCol="0">
+            <a:spAutoFit/>
+          </a:bodyPr>
+          <a:lstStyle/>
+          <a:p>
+            <a:r>
+              <a:rPr lang="en-US" dirty="0"/>
+              <a:t>A-S</a:t>
             </a:r>
           </a:p>
         </p:txBody>
       </p:sp>
       <p:pic>
         <p:nvPicPr>
-          <p:cNvPr id="5" name="Content Placeholder 4" descr="A picture containing chart&#10;&#10;Description automatically generated">
+          <p:cNvPr id="6" name="Content Placeholder 4" descr="A picture containing chart&#10;&#10;Description automatically generated">
             <a:extLst>
               <a:ext uri="{FF2B5EF4-FFF2-40B4-BE49-F238E27FC236}">
-                <a16:creationId xmlns:a16="http://schemas.microsoft.com/office/drawing/2014/main" id="{29D7F3A4-EA4E-4BBA-89A5-07570C937050}"/>
+                <a16:creationId xmlns:a16="http://schemas.microsoft.com/office/drawing/2014/main" id="{0B12C01C-C5EC-4720-88E0-896E48AF75CE}"/>
               </a:ext>
             </a:extLst>
           </p:cNvPr>
           <p:cNvPicPr>
-            <a:picLocks noGrp="1" noChangeAspect="1"/>
+            <a:picLocks noChangeAspect="1"/>
           </p:cNvPicPr>
-          <p:nvPr>
-            <p:ph idx="1"/>
-          </p:nvPr>
+          <p:nvPr/>
         </p:nvPicPr>
-        <p:blipFill>
+        <p:blipFill rotWithShape="1">
           <a:blip r:embed="rId2">
             <a:extLst>
               <a:ext uri="{28A0092B-C50C-407E-A947-70E740481C1C}">
@@ -8307,56 +8619,23 @@
               </a:ext>
             </a:extLst>
           </a:blip>
-          <a:stretch>
-            <a:fillRect/>
-          </a:stretch>
+          <a:srcRect l="7965" t="5446" r="9615" b="-1338"/>
+          <a:stretch/>
         </p:blipFill>
         <p:spPr>
           <a:xfrm>
-            <a:off x="-1155053" y="1288473"/>
-            <a:ext cx="14502105" cy="3625525"/>
-          </a:xfrm>
-        </p:spPr>
-      </p:pic>
-      <p:sp>
-        <p:nvSpPr>
-          <p:cNvPr id="3" name="TextBox 2">
-            <a:extLst>
-              <a:ext uri="{FF2B5EF4-FFF2-40B4-BE49-F238E27FC236}">
-                <a16:creationId xmlns:a16="http://schemas.microsoft.com/office/drawing/2014/main" id="{3CCEF24E-5ED2-4FE5-8114-1565A5F24C71}"/>
-              </a:ext>
-            </a:extLst>
-          </p:cNvPr>
-          <p:cNvSpPr txBox="1"/>
-          <p:nvPr/>
-        </p:nvSpPr>
-        <p:spPr>
-          <a:xfrm>
-            <a:off x="556591" y="5384861"/>
-            <a:ext cx="10986052" cy="646331"/>
+            <a:off x="609600" y="1798321"/>
+            <a:ext cx="9953625" cy="2895172"/>
           </a:xfrm>
           <a:prstGeom prst="rect">
             <a:avLst/>
           </a:prstGeom>
-          <a:noFill/>
         </p:spPr>
-        <p:txBody>
-          <a:bodyPr wrap="square" rtlCol="0">
-            <a:spAutoFit/>
-          </a:bodyPr>
-          <a:lstStyle/>
-          <a:p>
-            <a:r>
-              <a:rPr lang="en-US" dirty="0"/>
-              <a:t>We can demonstrate starting in the middle of the year 2020 the inventory in housing decreased drastically compared to previous years. </a:t>
-            </a:r>
-          </a:p>
-        </p:txBody>
-      </p:sp>
+      </p:pic>
     </p:spTree>
     <p:extLst>
       <p:ext uri="{BB962C8B-B14F-4D97-AF65-F5344CB8AC3E}">
-        <p14:creationId xmlns:p14="http://schemas.microsoft.com/office/powerpoint/2010/main" val="1134669462"/>
+        <p14:creationId xmlns:p14="http://schemas.microsoft.com/office/powerpoint/2010/main" val="3508497141"/>
       </p:ext>
     </p:extLst>
   </p:cSld>

</xml_diff>

<commit_message>
added lumber v listings slide
</commit_message>
<xml_diff>
--- a/Texas Housing Market Analysis PowerPoint.pptx
+++ b/Texas Housing Market Analysis PowerPoint.pptx
@@ -17,9 +17,10 @@
     <p:sldId id="274" r:id="rId11"/>
     <p:sldId id="275" r:id="rId12"/>
     <p:sldId id="276" r:id="rId13"/>
-    <p:sldId id="277" r:id="rId14"/>
-    <p:sldId id="278" r:id="rId15"/>
-    <p:sldId id="265" r:id="rId16"/>
+    <p:sldId id="279" r:id="rId14"/>
+    <p:sldId id="277" r:id="rId15"/>
+    <p:sldId id="278" r:id="rId16"/>
+    <p:sldId id="265" r:id="rId17"/>
   </p:sldIdLst>
   <p:sldSz cx="12192000" cy="6858000"/>
   <p:notesSz cx="6858000" cy="9144000"/>
@@ -6649,17 +6650,6 @@
               <a:t>The demonstration shows a drastic change in Lumber prices after April 2020.</a:t>
             </a:r>
           </a:p>
-          <a:p>
-            <a:r>
-              <a:rPr lang="en-US" sz="1600" dirty="0">
-                <a:solidFill>
-                  <a:schemeClr val="tx1"/>
-                </a:solidFill>
-              </a:rPr>
-              <a:t>If the price of lumber continues to increase, we expect the price of construction to continue to increasing.</a:t>
-            </a:r>
-            <a:endParaRPr lang="en-US" sz="1600" dirty="0"/>
-          </a:p>
         </p:txBody>
       </p:sp>
       <p:sp>
@@ -6796,7 +6786,7 @@
                   <a:schemeClr val="accent1"/>
                 </a:solidFill>
               </a:rPr>
-              <a:t>Price Oil Index vs House Price Index</a:t>
+              <a:t>Lumber Price</a:t>
             </a:r>
           </a:p>
         </p:txBody>
@@ -6819,7 +6809,7 @@
         </p:nvSpPr>
         <p:spPr>
           <a:xfrm>
-            <a:off x="609600" y="4638674"/>
+            <a:off x="609600" y="5486399"/>
             <a:ext cx="8686800" cy="1333831"/>
           </a:xfrm>
         </p:spPr>
@@ -6829,14 +6819,13 @@
           </a:bodyPr>
           <a:lstStyle/>
           <a:p>
-            <a:pPr>
-              <a:spcAft>
-                <a:spcPts val="600"/>
-              </a:spcAft>
-            </a:pPr>
-            <a:r>
-              <a:rPr lang="en-US" sz="1600" dirty="0"/>
-              <a:t>There is no evident relationship between oil prices and the house price index.</a:t>
+            <a:r>
+              <a:rPr lang="en-US" sz="1600" dirty="0">
+                <a:solidFill>
+                  <a:schemeClr val="tx1"/>
+                </a:solidFill>
+              </a:rPr>
+              <a:t>There is a direct inverse relationship between the price of lumber and the housing listings</a:t>
             </a:r>
           </a:p>
         </p:txBody>
@@ -6878,10 +6867,10 @@
       </p:sp>
       <p:pic>
         <p:nvPicPr>
-          <p:cNvPr id="7" name="Picture 6" descr="A screenshot of a computer&#10;&#10;Description automatically generated with medium confidence">
+          <p:cNvPr id="7" name="Picture 6" descr="Chart, scatter chart&#10;&#10;Description automatically generated">
             <a:extLst>
               <a:ext uri="{FF2B5EF4-FFF2-40B4-BE49-F238E27FC236}">
-                <a16:creationId xmlns:a16="http://schemas.microsoft.com/office/drawing/2014/main" id="{3C04963E-7533-4A0F-9C18-0942EB1EBF94}"/>
+                <a16:creationId xmlns:a16="http://schemas.microsoft.com/office/drawing/2014/main" id="{70FD6DC9-8124-4E25-80BF-BE39D49D0225}"/>
               </a:ext>
             </a:extLst>
           </p:cNvPr>
@@ -6890,7 +6879,7 @@
           </p:cNvPicPr>
           <p:nvPr/>
         </p:nvPicPr>
-        <p:blipFill rotWithShape="1">
+        <p:blipFill>
           <a:blip r:embed="rId2">
             <a:extLst>
               <a:ext uri="{28A0092B-C50C-407E-A947-70E740481C1C}">
@@ -6898,13 +6887,14 @@
               </a:ext>
             </a:extLst>
           </a:blip>
-          <a:srcRect l="9686" r="8448"/>
-          <a:stretch/>
+          <a:stretch>
+            <a:fillRect/>
+          </a:stretch>
         </p:blipFill>
         <p:spPr>
           <a:xfrm>
-            <a:off x="609600" y="1798320"/>
-            <a:ext cx="9553575" cy="2598980"/>
+            <a:off x="609600" y="1402538"/>
+            <a:ext cx="5485714" cy="3657143"/>
           </a:xfrm>
           <a:prstGeom prst="rect">
             <a:avLst/>
@@ -6914,7 +6904,7 @@
     </p:spTree>
     <p:extLst>
       <p:ext uri="{BB962C8B-B14F-4D97-AF65-F5344CB8AC3E}">
-        <p14:creationId xmlns:p14="http://schemas.microsoft.com/office/powerpoint/2010/main" val="2597594891"/>
+        <p14:creationId xmlns:p14="http://schemas.microsoft.com/office/powerpoint/2010/main" val="3406134787"/>
       </p:ext>
     </p:extLst>
   </p:cSld>
@@ -6946,6 +6936,185 @@
           <p:cNvPr id="2" name="Title 1">
             <a:extLst>
               <a:ext uri="{FF2B5EF4-FFF2-40B4-BE49-F238E27FC236}">
+                <a16:creationId xmlns:a16="http://schemas.microsoft.com/office/drawing/2014/main" id="{E92B9D07-598B-45D7-B29C-341FB8AA9F38}"/>
+              </a:ext>
+            </a:extLst>
+          </p:cNvPr>
+          <p:cNvSpPr>
+            <a:spLocks noGrp="1"/>
+          </p:cNvSpPr>
+          <p:nvPr>
+            <p:ph type="title"/>
+          </p:nvPr>
+        </p:nvSpPr>
+        <p:spPr>
+          <a:xfrm>
+            <a:off x="609600" y="609600"/>
+            <a:ext cx="10972800" cy="1188720"/>
+          </a:xfrm>
+        </p:spPr>
+        <p:txBody>
+          <a:bodyPr>
+            <a:normAutofit/>
+          </a:bodyPr>
+          <a:lstStyle/>
+          <a:p>
+            <a:r>
+              <a:rPr lang="en-US" sz="4400" dirty="0">
+                <a:solidFill>
+                  <a:schemeClr val="accent1"/>
+                </a:solidFill>
+              </a:rPr>
+              <a:t>Price Oil Index vs House Price Index</a:t>
+            </a:r>
+          </a:p>
+        </p:txBody>
+      </p:sp>
+      <p:sp>
+        <p:nvSpPr>
+          <p:cNvPr id="3" name="Content Placeholder 2">
+            <a:extLst>
+              <a:ext uri="{FF2B5EF4-FFF2-40B4-BE49-F238E27FC236}">
+                <a16:creationId xmlns:a16="http://schemas.microsoft.com/office/drawing/2014/main" id="{8ED9684F-640E-42C2-823B-2923431F4A25}"/>
+              </a:ext>
+            </a:extLst>
+          </p:cNvPr>
+          <p:cNvSpPr>
+            <a:spLocks noGrp="1"/>
+          </p:cNvSpPr>
+          <p:nvPr>
+            <p:ph idx="1"/>
+          </p:nvPr>
+        </p:nvSpPr>
+        <p:spPr>
+          <a:xfrm>
+            <a:off x="609600" y="4638674"/>
+            <a:ext cx="8686800" cy="1333831"/>
+          </a:xfrm>
+        </p:spPr>
+        <p:txBody>
+          <a:bodyPr>
+            <a:normAutofit/>
+          </a:bodyPr>
+          <a:lstStyle/>
+          <a:p>
+            <a:pPr>
+              <a:spcAft>
+                <a:spcPts val="600"/>
+              </a:spcAft>
+            </a:pPr>
+            <a:r>
+              <a:rPr lang="en-US" sz="1600" dirty="0"/>
+              <a:t>There is no evident relationship between oil prices and the house price index.</a:t>
+            </a:r>
+          </a:p>
+        </p:txBody>
+      </p:sp>
+      <p:sp>
+        <p:nvSpPr>
+          <p:cNvPr id="4" name="TextBox 3">
+            <a:extLst>
+              <a:ext uri="{FF2B5EF4-FFF2-40B4-BE49-F238E27FC236}">
+                <a16:creationId xmlns:a16="http://schemas.microsoft.com/office/drawing/2014/main" id="{638C66DA-09F4-4366-A640-2F6FB694F618}"/>
+              </a:ext>
+            </a:extLst>
+          </p:cNvPr>
+          <p:cNvSpPr txBox="1"/>
+          <p:nvPr/>
+        </p:nvSpPr>
+        <p:spPr>
+          <a:xfrm>
+            <a:off x="11353801" y="6042991"/>
+            <a:ext cx="598862" cy="369332"/>
+          </a:xfrm>
+          <a:prstGeom prst="rect">
+            <a:avLst/>
+          </a:prstGeom>
+          <a:noFill/>
+        </p:spPr>
+        <p:txBody>
+          <a:bodyPr wrap="square" rtlCol="0">
+            <a:spAutoFit/>
+          </a:bodyPr>
+          <a:lstStyle/>
+          <a:p>
+            <a:r>
+              <a:rPr lang="en-US" dirty="0"/>
+              <a:t>A-S</a:t>
+            </a:r>
+          </a:p>
+        </p:txBody>
+      </p:sp>
+      <p:pic>
+        <p:nvPicPr>
+          <p:cNvPr id="7" name="Picture 6" descr="A screenshot of a computer&#10;&#10;Description automatically generated with medium confidence">
+            <a:extLst>
+              <a:ext uri="{FF2B5EF4-FFF2-40B4-BE49-F238E27FC236}">
+                <a16:creationId xmlns:a16="http://schemas.microsoft.com/office/drawing/2014/main" id="{3C04963E-7533-4A0F-9C18-0942EB1EBF94}"/>
+              </a:ext>
+            </a:extLst>
+          </p:cNvPr>
+          <p:cNvPicPr>
+            <a:picLocks noChangeAspect="1"/>
+          </p:cNvPicPr>
+          <p:nvPr/>
+        </p:nvPicPr>
+        <p:blipFill rotWithShape="1">
+          <a:blip r:embed="rId2">
+            <a:extLst>
+              <a:ext uri="{28A0092B-C50C-407E-A947-70E740481C1C}">
+                <a14:useLocalDpi xmlns:a14="http://schemas.microsoft.com/office/drawing/2010/main" val="0"/>
+              </a:ext>
+            </a:extLst>
+          </a:blip>
+          <a:srcRect l="9686" r="8448"/>
+          <a:stretch/>
+        </p:blipFill>
+        <p:spPr>
+          <a:xfrm>
+            <a:off x="609600" y="1798320"/>
+            <a:ext cx="9553575" cy="2598980"/>
+          </a:xfrm>
+          <a:prstGeom prst="rect">
+            <a:avLst/>
+          </a:prstGeom>
+        </p:spPr>
+      </p:pic>
+    </p:spTree>
+    <p:extLst>
+      <p:ext uri="{BB962C8B-B14F-4D97-AF65-F5344CB8AC3E}">
+        <p14:creationId xmlns:p14="http://schemas.microsoft.com/office/powerpoint/2010/main" val="2597594891"/>
+      </p:ext>
+    </p:extLst>
+  </p:cSld>
+  <p:clrMapOvr>
+    <a:masterClrMapping/>
+  </p:clrMapOvr>
+</p:sld>
+</file>
+
+<file path=ppt/slides/slide15.xml><?xml version="1.0" encoding="utf-8"?>
+<p:sld xmlns:a="http://schemas.openxmlformats.org/drawingml/2006/main" xmlns:r="http://schemas.openxmlformats.org/officeDocument/2006/relationships" xmlns:p="http://schemas.openxmlformats.org/presentationml/2006/main">
+  <p:cSld>
+    <p:spTree>
+      <p:nvGrpSpPr>
+        <p:cNvPr id="1" name=""/>
+        <p:cNvGrpSpPr/>
+        <p:nvPr/>
+      </p:nvGrpSpPr>
+      <p:grpSpPr>
+        <a:xfrm>
+          <a:off x="0" y="0"/>
+          <a:ext cx="0" cy="0"/>
+          <a:chOff x="0" y="0"/>
+          <a:chExt cx="0" cy="0"/>
+        </a:xfrm>
+      </p:grpSpPr>
+      <p:sp>
+        <p:nvSpPr>
+          <p:cNvPr id="2" name="Title 1">
+            <a:extLst>
+              <a:ext uri="{FF2B5EF4-FFF2-40B4-BE49-F238E27FC236}">
                 <a16:creationId xmlns:a16="http://schemas.microsoft.com/office/drawing/2014/main" id="{8AED9D6C-0C8A-4924-BA13-6C4987AD043B}"/>
               </a:ext>
             </a:extLst>
@@ -7182,7 +7351,7 @@
 </p:sld>
 </file>
 
-<file path=ppt/slides/slide15.xml><?xml version="1.0" encoding="utf-8"?>
+<file path=ppt/slides/slide16.xml><?xml version="1.0" encoding="utf-8"?>
 <p:sld xmlns:a="http://schemas.openxmlformats.org/drawingml/2006/main" xmlns:r="http://schemas.openxmlformats.org/officeDocument/2006/relationships" xmlns:p="http://schemas.openxmlformats.org/presentationml/2006/main">
   <p:cSld>
     <p:bg>

</xml_diff>

<commit_message>
Updated PPT presentation and README file
</commit_message>
<xml_diff>
--- a/Texas Housing Market Analysis PowerPoint.pptx
+++ b/Texas Housing Market Analysis PowerPoint.pptx
@@ -16,11 +16,12 @@
     <p:sldId id="273" r:id="rId10"/>
     <p:sldId id="274" r:id="rId11"/>
     <p:sldId id="275" r:id="rId12"/>
-    <p:sldId id="276" r:id="rId13"/>
-    <p:sldId id="279" r:id="rId14"/>
-    <p:sldId id="277" r:id="rId15"/>
-    <p:sldId id="278" r:id="rId16"/>
-    <p:sldId id="265" r:id="rId17"/>
+    <p:sldId id="280" r:id="rId13"/>
+    <p:sldId id="277" r:id="rId14"/>
+    <p:sldId id="276" r:id="rId15"/>
+    <p:sldId id="279" r:id="rId16"/>
+    <p:sldId id="278" r:id="rId17"/>
+    <p:sldId id="265" r:id="rId18"/>
   </p:sldIdLst>
   <p:sldSz cx="12192000" cy="6858000"/>
   <p:notesSz cx="6858000" cy="9144000"/>
@@ -6579,6 +6580,140 @@
           <p:cNvPr id="2" name="Title 1">
             <a:extLst>
               <a:ext uri="{FF2B5EF4-FFF2-40B4-BE49-F238E27FC236}">
+                <a16:creationId xmlns:a16="http://schemas.microsoft.com/office/drawing/2014/main" id="{3F063AF4-621E-4251-ADC1-11C3D31D2238}"/>
+              </a:ext>
+            </a:extLst>
+          </p:cNvPr>
+          <p:cNvSpPr>
+            <a:spLocks noGrp="1"/>
+          </p:cNvSpPr>
+          <p:nvPr>
+            <p:ph type="title"/>
+          </p:nvPr>
+        </p:nvSpPr>
+        <p:spPr>
+          <a:xfrm>
+            <a:off x="591207" y="609600"/>
+            <a:ext cx="9341069" cy="817179"/>
+          </a:xfrm>
+        </p:spPr>
+        <p:txBody>
+          <a:bodyPr/>
+          <a:lstStyle/>
+          <a:p>
+            <a:r>
+              <a:rPr lang="en-US" sz="3600" dirty="0"/>
+              <a:t>Housing vs. Commodities Percent Change</a:t>
+            </a:r>
+            <a:endParaRPr lang="en-US" dirty="0"/>
+          </a:p>
+        </p:txBody>
+      </p:sp>
+      <p:pic>
+        <p:nvPicPr>
+          <p:cNvPr id="9" name="Content Placeholder 8" descr="A screenshot of a computer&#10;&#10;Description automatically generated with low confidence">
+            <a:extLst>
+              <a:ext uri="{FF2B5EF4-FFF2-40B4-BE49-F238E27FC236}">
+                <a16:creationId xmlns:a16="http://schemas.microsoft.com/office/drawing/2014/main" id="{2CFC7692-9205-4997-9040-C529481AEC4B}"/>
+              </a:ext>
+            </a:extLst>
+          </p:cNvPr>
+          <p:cNvPicPr>
+            <a:picLocks noGrp="1" noChangeAspect="1"/>
+          </p:cNvPicPr>
+          <p:nvPr>
+            <p:ph idx="1"/>
+          </p:nvPr>
+        </p:nvPicPr>
+        <p:blipFill>
+          <a:blip r:embed="rId2">
+            <a:extLst>
+              <a:ext uri="{28A0092B-C50C-407E-A947-70E740481C1C}">
+                <a14:useLocalDpi xmlns:a14="http://schemas.microsoft.com/office/drawing/2010/main" val="0"/>
+              </a:ext>
+            </a:extLst>
+          </a:blip>
+          <a:stretch>
+            <a:fillRect/>
+          </a:stretch>
+        </p:blipFill>
+        <p:spPr>
+          <a:xfrm>
+            <a:off x="-1113440" y="977881"/>
+            <a:ext cx="12590749" cy="4196916"/>
+          </a:xfrm>
+        </p:spPr>
+      </p:pic>
+      <p:sp>
+        <p:nvSpPr>
+          <p:cNvPr id="11" name="TextBox 10">
+            <a:extLst>
+              <a:ext uri="{FF2B5EF4-FFF2-40B4-BE49-F238E27FC236}">
+                <a16:creationId xmlns:a16="http://schemas.microsoft.com/office/drawing/2014/main" id="{54702383-DC50-497B-A126-8CF2600EF13F}"/>
+              </a:ext>
+            </a:extLst>
+          </p:cNvPr>
+          <p:cNvSpPr txBox="1"/>
+          <p:nvPr/>
+        </p:nvSpPr>
+        <p:spPr>
+          <a:xfrm>
+            <a:off x="310244" y="5290458"/>
+            <a:ext cx="10662556" cy="923330"/>
+          </a:xfrm>
+          <a:prstGeom prst="rect">
+            <a:avLst/>
+          </a:prstGeom>
+          <a:noFill/>
+        </p:spPr>
+        <p:txBody>
+          <a:bodyPr wrap="square">
+            <a:spAutoFit/>
+          </a:bodyPr>
+          <a:lstStyle/>
+          <a:p>
+            <a:r>
+              <a:rPr lang="en-US" sz="1800" dirty="0"/>
+              <a:t>The housing price changes is not immediate to changes in price fluctuation. In 2008 the housing crisis had minimal effects on the Texas housing market.  However, housing pricing did seem to increase as the price of lumber had the most dramatic increase in prices. </a:t>
+            </a:r>
+          </a:p>
+        </p:txBody>
+      </p:sp>
+    </p:spTree>
+    <p:extLst>
+      <p:ext uri="{BB962C8B-B14F-4D97-AF65-F5344CB8AC3E}">
+        <p14:creationId xmlns:p14="http://schemas.microsoft.com/office/powerpoint/2010/main" val="3398665317"/>
+      </p:ext>
+    </p:extLst>
+  </p:cSld>
+  <p:clrMapOvr>
+    <a:masterClrMapping/>
+  </p:clrMapOvr>
+</p:sld>
+</file>
+
+<file path=ppt/slides/slide13.xml><?xml version="1.0" encoding="utf-8"?>
+<p:sld xmlns:a="http://schemas.openxmlformats.org/drawingml/2006/main" xmlns:r="http://schemas.openxmlformats.org/officeDocument/2006/relationships" xmlns:p="http://schemas.openxmlformats.org/presentationml/2006/main">
+  <p:cSld>
+    <p:spTree>
+      <p:nvGrpSpPr>
+        <p:cNvPr id="1" name=""/>
+        <p:cNvGrpSpPr/>
+        <p:nvPr/>
+      </p:nvGrpSpPr>
+      <p:grpSpPr>
+        <a:xfrm>
+          <a:off x="0" y="0"/>
+          <a:ext cx="0" cy="0"/>
+          <a:chOff x="0" y="0"/>
+          <a:chExt cx="0" cy="0"/>
+        </a:xfrm>
+      </p:grpSpPr>
+      <p:sp>
+        <p:nvSpPr>
+          <p:cNvPr id="2" name="Title 1">
+            <a:extLst>
+              <a:ext uri="{FF2B5EF4-FFF2-40B4-BE49-F238E27FC236}">
                 <a16:creationId xmlns:a16="http://schemas.microsoft.com/office/drawing/2014/main" id="{E92B9D07-598B-45D7-B29C-341FB8AA9F38}"/>
               </a:ext>
             </a:extLst>
@@ -6608,7 +6743,7 @@
                   <a:schemeClr val="accent1"/>
                 </a:solidFill>
               </a:rPr>
-              <a:t>Lumber Price</a:t>
+              <a:t>Price Oil Index vs House Price Index</a:t>
             </a:r>
           </a:p>
         </p:txBody>
@@ -6631,7 +6766,7 @@
         </p:nvSpPr>
         <p:spPr>
           <a:xfrm>
-            <a:off x="609600" y="5486399"/>
+            <a:off x="609600" y="4638674"/>
             <a:ext cx="8686800" cy="1333831"/>
           </a:xfrm>
         </p:spPr>
@@ -6641,48 +6776,157 @@
           </a:bodyPr>
           <a:lstStyle/>
           <a:p>
-            <a:r>
-              <a:rPr lang="en-US" sz="1600" dirty="0">
-                <a:solidFill>
-                  <a:schemeClr val="tx1"/>
-                </a:solidFill>
-              </a:rPr>
-              <a:t>The demonstration shows a drastic change in Lumber prices after April 2020.</a:t>
-            </a:r>
-          </a:p>
-        </p:txBody>
-      </p:sp>
-      <p:sp>
-        <p:nvSpPr>
-          <p:cNvPr id="4" name="TextBox 3">
+            <a:pPr>
+              <a:spcAft>
+                <a:spcPts val="600"/>
+              </a:spcAft>
+            </a:pPr>
+            <a:r>
+              <a:rPr lang="en-US" sz="1600" dirty="0"/>
+              <a:t>There is no evident relationship between oil prices and the house price index.</a:t>
+            </a:r>
+          </a:p>
+        </p:txBody>
+      </p:sp>
+      <p:pic>
+        <p:nvPicPr>
+          <p:cNvPr id="7" name="Picture 6" descr="A screenshot of a computer&#10;&#10;Description automatically generated with medium confidence">
             <a:extLst>
               <a:ext uri="{FF2B5EF4-FFF2-40B4-BE49-F238E27FC236}">
-                <a16:creationId xmlns:a16="http://schemas.microsoft.com/office/drawing/2014/main" id="{638C66DA-09F4-4366-A640-2F6FB694F618}"/>
+                <a16:creationId xmlns:a16="http://schemas.microsoft.com/office/drawing/2014/main" id="{3C04963E-7533-4A0F-9C18-0942EB1EBF94}"/>
               </a:ext>
             </a:extLst>
           </p:cNvPr>
-          <p:cNvSpPr txBox="1"/>
+          <p:cNvPicPr>
+            <a:picLocks noChangeAspect="1"/>
+          </p:cNvPicPr>
           <p:nvPr/>
-        </p:nvSpPr>
+        </p:nvPicPr>
+        <p:blipFill rotWithShape="1">
+          <a:blip r:embed="rId2">
+            <a:extLst>
+              <a:ext uri="{28A0092B-C50C-407E-A947-70E740481C1C}">
+                <a14:useLocalDpi xmlns:a14="http://schemas.microsoft.com/office/drawing/2010/main" val="0"/>
+              </a:ext>
+            </a:extLst>
+          </a:blip>
+          <a:srcRect l="9686" r="8448"/>
+          <a:stretch/>
+        </p:blipFill>
         <p:spPr>
           <a:xfrm>
-            <a:off x="11353801" y="6042991"/>
-            <a:ext cx="598862" cy="369332"/>
+            <a:off x="609600" y="1798320"/>
+            <a:ext cx="9553575" cy="2598980"/>
           </a:xfrm>
           <a:prstGeom prst="rect">
             <a:avLst/>
           </a:prstGeom>
-          <a:noFill/>
         </p:spPr>
-        <p:txBody>
-          <a:bodyPr wrap="square" rtlCol="0">
-            <a:spAutoFit/>
+      </p:pic>
+    </p:spTree>
+    <p:extLst>
+      <p:ext uri="{BB962C8B-B14F-4D97-AF65-F5344CB8AC3E}">
+        <p14:creationId xmlns:p14="http://schemas.microsoft.com/office/powerpoint/2010/main" val="2597594891"/>
+      </p:ext>
+    </p:extLst>
+  </p:cSld>
+  <p:clrMapOvr>
+    <a:masterClrMapping/>
+  </p:clrMapOvr>
+</p:sld>
+</file>
+
+<file path=ppt/slides/slide14.xml><?xml version="1.0" encoding="utf-8"?>
+<p:sld xmlns:a="http://schemas.openxmlformats.org/drawingml/2006/main" xmlns:r="http://schemas.openxmlformats.org/officeDocument/2006/relationships" xmlns:p="http://schemas.openxmlformats.org/presentationml/2006/main">
+  <p:cSld>
+    <p:spTree>
+      <p:nvGrpSpPr>
+        <p:cNvPr id="1" name=""/>
+        <p:cNvGrpSpPr/>
+        <p:nvPr/>
+      </p:nvGrpSpPr>
+      <p:grpSpPr>
+        <a:xfrm>
+          <a:off x="0" y="0"/>
+          <a:ext cx="0" cy="0"/>
+          <a:chOff x="0" y="0"/>
+          <a:chExt cx="0" cy="0"/>
+        </a:xfrm>
+      </p:grpSpPr>
+      <p:sp>
+        <p:nvSpPr>
+          <p:cNvPr id="2" name="Title 1">
+            <a:extLst>
+              <a:ext uri="{FF2B5EF4-FFF2-40B4-BE49-F238E27FC236}">
+                <a16:creationId xmlns:a16="http://schemas.microsoft.com/office/drawing/2014/main" id="{E92B9D07-598B-45D7-B29C-341FB8AA9F38}"/>
+              </a:ext>
+            </a:extLst>
+          </p:cNvPr>
+          <p:cNvSpPr>
+            <a:spLocks noGrp="1"/>
+          </p:cNvSpPr>
+          <p:nvPr>
+            <p:ph type="title"/>
+          </p:nvPr>
+        </p:nvSpPr>
+        <p:spPr>
+          <a:xfrm>
+            <a:off x="609600" y="609600"/>
+            <a:ext cx="10972800" cy="1188720"/>
+          </a:xfrm>
+        </p:spPr>
+        <p:txBody>
+          <a:bodyPr>
+            <a:normAutofit/>
           </a:bodyPr>
           <a:lstStyle/>
           <a:p>
             <a:r>
-              <a:rPr lang="en-US" dirty="0"/>
-              <a:t>A-S</a:t>
+              <a:rPr lang="en-US" sz="4400" dirty="0">
+                <a:solidFill>
+                  <a:schemeClr val="accent1"/>
+                </a:solidFill>
+              </a:rPr>
+              <a:t>Lumber Price</a:t>
+            </a:r>
+          </a:p>
+        </p:txBody>
+      </p:sp>
+      <p:sp>
+        <p:nvSpPr>
+          <p:cNvPr id="3" name="Content Placeholder 2">
+            <a:extLst>
+              <a:ext uri="{FF2B5EF4-FFF2-40B4-BE49-F238E27FC236}">
+                <a16:creationId xmlns:a16="http://schemas.microsoft.com/office/drawing/2014/main" id="{8ED9684F-640E-42C2-823B-2923431F4A25}"/>
+              </a:ext>
+            </a:extLst>
+          </p:cNvPr>
+          <p:cNvSpPr>
+            <a:spLocks noGrp="1"/>
+          </p:cNvSpPr>
+          <p:nvPr>
+            <p:ph idx="1"/>
+          </p:nvPr>
+        </p:nvSpPr>
+        <p:spPr>
+          <a:xfrm>
+            <a:off x="609600" y="5486399"/>
+            <a:ext cx="8686800" cy="1333831"/>
+          </a:xfrm>
+        </p:spPr>
+        <p:txBody>
+          <a:bodyPr>
+            <a:normAutofit/>
+          </a:bodyPr>
+          <a:lstStyle/>
+          <a:p>
+            <a:r>
+              <a:rPr lang="en-US" sz="1600" dirty="0">
+                <a:solidFill>
+                  <a:schemeClr val="tx1"/>
+                </a:solidFill>
+              </a:rPr>
+              <a:t>The demonstration shows a drastic increase in Lumber prices after April 2020.</a:t>
             </a:r>
           </a:p>
         </p:txBody>
@@ -6735,7 +6979,7 @@
 </p:sld>
 </file>
 
-<file path=ppt/slides/slide13.xml><?xml version="1.0" encoding="utf-8"?>
+<file path=ppt/slides/slide15.xml><?xml version="1.0" encoding="utf-8"?>
 <p:sld xmlns:a="http://schemas.openxmlformats.org/drawingml/2006/main" xmlns:r="http://schemas.openxmlformats.org/officeDocument/2006/relationships" xmlns:p="http://schemas.openxmlformats.org/presentationml/2006/main">
   <p:cSld>
     <p:spTree>
@@ -6826,41 +7070,6 @@
                 </a:solidFill>
               </a:rPr>
               <a:t>There is a direct inverse relationship between the price of lumber and the housing listings</a:t>
-            </a:r>
-          </a:p>
-        </p:txBody>
-      </p:sp>
-      <p:sp>
-        <p:nvSpPr>
-          <p:cNvPr id="4" name="TextBox 3">
-            <a:extLst>
-              <a:ext uri="{FF2B5EF4-FFF2-40B4-BE49-F238E27FC236}">
-                <a16:creationId xmlns:a16="http://schemas.microsoft.com/office/drawing/2014/main" id="{638C66DA-09F4-4366-A640-2F6FB694F618}"/>
-              </a:ext>
-            </a:extLst>
-          </p:cNvPr>
-          <p:cNvSpPr txBox="1"/>
-          <p:nvPr/>
-        </p:nvSpPr>
-        <p:spPr>
-          <a:xfrm>
-            <a:off x="11353801" y="6042991"/>
-            <a:ext cx="598862" cy="369332"/>
-          </a:xfrm>
-          <a:prstGeom prst="rect">
-            <a:avLst/>
-          </a:prstGeom>
-          <a:noFill/>
-        </p:spPr>
-        <p:txBody>
-          <a:bodyPr wrap="square" rtlCol="0">
-            <a:spAutoFit/>
-          </a:bodyPr>
-          <a:lstStyle/>
-          <a:p>
-            <a:r>
-              <a:rPr lang="en-US" dirty="0"/>
-              <a:t>A-S</a:t>
             </a:r>
           </a:p>
         </p:txBody>
@@ -6914,7 +7123,7 @@
 </p:sld>
 </file>
 
-<file path=ppt/slides/slide14.xml><?xml version="1.0" encoding="utf-8"?>
+<file path=ppt/slides/slide16.xml><?xml version="1.0" encoding="utf-8"?>
 <p:sld xmlns:a="http://schemas.openxmlformats.org/drawingml/2006/main" xmlns:r="http://schemas.openxmlformats.org/officeDocument/2006/relationships" xmlns:p="http://schemas.openxmlformats.org/presentationml/2006/main">
   <p:cSld>
     <p:spTree>
@@ -6936,185 +7145,6 @@
           <p:cNvPr id="2" name="Title 1">
             <a:extLst>
               <a:ext uri="{FF2B5EF4-FFF2-40B4-BE49-F238E27FC236}">
-                <a16:creationId xmlns:a16="http://schemas.microsoft.com/office/drawing/2014/main" id="{E92B9D07-598B-45D7-B29C-341FB8AA9F38}"/>
-              </a:ext>
-            </a:extLst>
-          </p:cNvPr>
-          <p:cNvSpPr>
-            <a:spLocks noGrp="1"/>
-          </p:cNvSpPr>
-          <p:nvPr>
-            <p:ph type="title"/>
-          </p:nvPr>
-        </p:nvSpPr>
-        <p:spPr>
-          <a:xfrm>
-            <a:off x="609600" y="609600"/>
-            <a:ext cx="10972800" cy="1188720"/>
-          </a:xfrm>
-        </p:spPr>
-        <p:txBody>
-          <a:bodyPr>
-            <a:normAutofit/>
-          </a:bodyPr>
-          <a:lstStyle/>
-          <a:p>
-            <a:r>
-              <a:rPr lang="en-US" sz="4400" dirty="0">
-                <a:solidFill>
-                  <a:schemeClr val="accent1"/>
-                </a:solidFill>
-              </a:rPr>
-              <a:t>Price Oil Index vs House Price Index</a:t>
-            </a:r>
-          </a:p>
-        </p:txBody>
-      </p:sp>
-      <p:sp>
-        <p:nvSpPr>
-          <p:cNvPr id="3" name="Content Placeholder 2">
-            <a:extLst>
-              <a:ext uri="{FF2B5EF4-FFF2-40B4-BE49-F238E27FC236}">
-                <a16:creationId xmlns:a16="http://schemas.microsoft.com/office/drawing/2014/main" id="{8ED9684F-640E-42C2-823B-2923431F4A25}"/>
-              </a:ext>
-            </a:extLst>
-          </p:cNvPr>
-          <p:cNvSpPr>
-            <a:spLocks noGrp="1"/>
-          </p:cNvSpPr>
-          <p:nvPr>
-            <p:ph idx="1"/>
-          </p:nvPr>
-        </p:nvSpPr>
-        <p:spPr>
-          <a:xfrm>
-            <a:off x="609600" y="4638674"/>
-            <a:ext cx="8686800" cy="1333831"/>
-          </a:xfrm>
-        </p:spPr>
-        <p:txBody>
-          <a:bodyPr>
-            <a:normAutofit/>
-          </a:bodyPr>
-          <a:lstStyle/>
-          <a:p>
-            <a:pPr>
-              <a:spcAft>
-                <a:spcPts val="600"/>
-              </a:spcAft>
-            </a:pPr>
-            <a:r>
-              <a:rPr lang="en-US" sz="1600" dirty="0"/>
-              <a:t>There is no evident relationship between oil prices and the house price index.</a:t>
-            </a:r>
-          </a:p>
-        </p:txBody>
-      </p:sp>
-      <p:sp>
-        <p:nvSpPr>
-          <p:cNvPr id="4" name="TextBox 3">
-            <a:extLst>
-              <a:ext uri="{FF2B5EF4-FFF2-40B4-BE49-F238E27FC236}">
-                <a16:creationId xmlns:a16="http://schemas.microsoft.com/office/drawing/2014/main" id="{638C66DA-09F4-4366-A640-2F6FB694F618}"/>
-              </a:ext>
-            </a:extLst>
-          </p:cNvPr>
-          <p:cNvSpPr txBox="1"/>
-          <p:nvPr/>
-        </p:nvSpPr>
-        <p:spPr>
-          <a:xfrm>
-            <a:off x="11353801" y="6042991"/>
-            <a:ext cx="598862" cy="369332"/>
-          </a:xfrm>
-          <a:prstGeom prst="rect">
-            <a:avLst/>
-          </a:prstGeom>
-          <a:noFill/>
-        </p:spPr>
-        <p:txBody>
-          <a:bodyPr wrap="square" rtlCol="0">
-            <a:spAutoFit/>
-          </a:bodyPr>
-          <a:lstStyle/>
-          <a:p>
-            <a:r>
-              <a:rPr lang="en-US" dirty="0"/>
-              <a:t>A-S</a:t>
-            </a:r>
-          </a:p>
-        </p:txBody>
-      </p:sp>
-      <p:pic>
-        <p:nvPicPr>
-          <p:cNvPr id="7" name="Picture 6" descr="A screenshot of a computer&#10;&#10;Description automatically generated with medium confidence">
-            <a:extLst>
-              <a:ext uri="{FF2B5EF4-FFF2-40B4-BE49-F238E27FC236}">
-                <a16:creationId xmlns:a16="http://schemas.microsoft.com/office/drawing/2014/main" id="{3C04963E-7533-4A0F-9C18-0942EB1EBF94}"/>
-              </a:ext>
-            </a:extLst>
-          </p:cNvPr>
-          <p:cNvPicPr>
-            <a:picLocks noChangeAspect="1"/>
-          </p:cNvPicPr>
-          <p:nvPr/>
-        </p:nvPicPr>
-        <p:blipFill rotWithShape="1">
-          <a:blip r:embed="rId2">
-            <a:extLst>
-              <a:ext uri="{28A0092B-C50C-407E-A947-70E740481C1C}">
-                <a14:useLocalDpi xmlns:a14="http://schemas.microsoft.com/office/drawing/2010/main" val="0"/>
-              </a:ext>
-            </a:extLst>
-          </a:blip>
-          <a:srcRect l="9686" r="8448"/>
-          <a:stretch/>
-        </p:blipFill>
-        <p:spPr>
-          <a:xfrm>
-            <a:off x="609600" y="1798320"/>
-            <a:ext cx="9553575" cy="2598980"/>
-          </a:xfrm>
-          <a:prstGeom prst="rect">
-            <a:avLst/>
-          </a:prstGeom>
-        </p:spPr>
-      </p:pic>
-    </p:spTree>
-    <p:extLst>
-      <p:ext uri="{BB962C8B-B14F-4D97-AF65-F5344CB8AC3E}">
-        <p14:creationId xmlns:p14="http://schemas.microsoft.com/office/powerpoint/2010/main" val="2597594891"/>
-      </p:ext>
-    </p:extLst>
-  </p:cSld>
-  <p:clrMapOvr>
-    <a:masterClrMapping/>
-  </p:clrMapOvr>
-</p:sld>
-</file>
-
-<file path=ppt/slides/slide15.xml><?xml version="1.0" encoding="utf-8"?>
-<p:sld xmlns:a="http://schemas.openxmlformats.org/drawingml/2006/main" xmlns:r="http://schemas.openxmlformats.org/officeDocument/2006/relationships" xmlns:p="http://schemas.openxmlformats.org/presentationml/2006/main">
-  <p:cSld>
-    <p:spTree>
-      <p:nvGrpSpPr>
-        <p:cNvPr id="1" name=""/>
-        <p:cNvGrpSpPr/>
-        <p:nvPr/>
-      </p:nvGrpSpPr>
-      <p:grpSpPr>
-        <a:xfrm>
-          <a:off x="0" y="0"/>
-          <a:ext cx="0" cy="0"/>
-          <a:chOff x="0" y="0"/>
-          <a:chExt cx="0" cy="0"/>
-        </a:xfrm>
-      </p:grpSpPr>
-      <p:sp>
-        <p:nvSpPr>
-          <p:cNvPr id="2" name="Title 1">
-            <a:extLst>
-              <a:ext uri="{FF2B5EF4-FFF2-40B4-BE49-F238E27FC236}">
                 <a16:creationId xmlns:a16="http://schemas.microsoft.com/office/drawing/2014/main" id="{8AED9D6C-0C8A-4924-BA13-6C4987AD043B}"/>
               </a:ext>
             </a:extLst>
@@ -7182,7 +7212,7 @@
               <a:rPr lang="en-US" sz="2000" dirty="0">
                 <a:latin typeface="+mj-lt"/>
               </a:rPr>
-              <a:t>Discuss any difficulties that arose, and how you dealt with them.</a:t>
+              <a:t>Difficulties:</a:t>
             </a:r>
           </a:p>
           <a:p>
@@ -7234,7 +7264,7 @@
               <a:rPr lang="en-US" sz="2000" dirty="0">
                 <a:latin typeface="+mj-lt"/>
               </a:rPr>
-              <a:t>Discuss any additional questions that came up, but which you didn't have time to answer: What would you research next, if you had two more weeks?</a:t>
+              <a:t>If we had more time….</a:t>
             </a:r>
           </a:p>
           <a:p>
@@ -7351,7 +7381,7 @@
 </p:sld>
 </file>
 
-<file path=ppt/slides/slide16.xml><?xml version="1.0" encoding="utf-8"?>
+<file path=ppt/slides/slide17.xml><?xml version="1.0" encoding="utf-8"?>
 <p:sld xmlns:a="http://schemas.openxmlformats.org/drawingml/2006/main" xmlns:r="http://schemas.openxmlformats.org/officeDocument/2006/relationships" xmlns:p="http://schemas.openxmlformats.org/presentationml/2006/main">
   <p:cSld>
     <p:bg>
@@ -8156,7 +8186,7 @@
                   <a:schemeClr val="tx1"/>
                 </a:solidFill>
               </a:rPr>
-              <a:t>Describe the exploration and cleanup process</a:t>
+              <a:t>All team members searched for data in various sites to acquire data for house pricing, inventory and pricing of commodities. </a:t>
             </a:r>
           </a:p>
           <a:p>
@@ -8166,7 +8196,7 @@
                   <a:schemeClr val="tx1"/>
                 </a:solidFill>
               </a:rPr>
-              <a:t>Discuss insights you had while exploring the data that you didn't anticipate</a:t>
+              <a:t>Of all the sources tried and tested, not all produced desired data. </a:t>
             </a:r>
           </a:p>
           <a:p>
@@ -8176,17 +8206,7 @@
                   <a:schemeClr val="tx1"/>
                 </a:solidFill>
               </a:rPr>
-              <a:t>Discuss any problems that arose after exploring the data, and how you resolved them</a:t>
-            </a:r>
-          </a:p>
-          <a:p>
-            <a:r>
-              <a:rPr lang="en-US" sz="2600" dirty="0">
-                <a:solidFill>
-                  <a:schemeClr val="tx1"/>
-                </a:solidFill>
-              </a:rPr>
-              <a:t>Present and discuss interesting figures developed during exploration, ideally with the help of Jupyter Notebook</a:t>
+              <a:t>Had issues with finding data sets that could be easily merged with other data sets</a:t>
             </a:r>
           </a:p>
         </p:txBody>
@@ -8309,8 +8329,8 @@
         </p:nvSpPr>
         <p:spPr>
           <a:xfrm>
-            <a:off x="609600" y="1798320"/>
-            <a:ext cx="9144000" cy="3880773"/>
+            <a:off x="520262" y="1907628"/>
+            <a:ext cx="9569670" cy="4504695"/>
           </a:xfrm>
         </p:spPr>
         <p:txBody>
@@ -8320,23 +8340,84 @@
           <a:lstStyle/>
           <a:p>
             <a:r>
-              <a:rPr lang="en-US" sz="2600" dirty="0">
+              <a:rPr lang="en-US" sz="3200" dirty="0">
                 <a:solidFill>
                   <a:schemeClr val="tx1"/>
                 </a:solidFill>
               </a:rPr>
-              <a:t>Discuss the steps you took to analyze the data and answer each question you asked in your proposal</a:t>
-            </a:r>
-          </a:p>
-          <a:p>
-            <a:r>
-              <a:rPr lang="en-US" sz="2600" dirty="0">
+              <a:t>Used the following </a:t>
+            </a:r>
+            <a:r>
+              <a:rPr lang="en-US" sz="3200" dirty="0" err="1">
                 <a:solidFill>
                   <a:schemeClr val="tx1"/>
                 </a:solidFill>
               </a:rPr>
-              <a:t>Present and discuss interesting figures developed during analysis, ideally with the help of Jupyter Notebook</a:t>
-            </a:r>
+              <a:t>Jupyter</a:t>
+            </a:r>
+            <a:r>
+              <a:rPr lang="en-US" sz="3200" dirty="0">
+                <a:solidFill>
+                  <a:schemeClr val="tx1"/>
+                </a:solidFill>
+              </a:rPr>
+              <a:t> Notebooks to read the csv files, merge the data sets for the metropolitan areas and create several sets of visualizations. </a:t>
+            </a:r>
+          </a:p>
+          <a:p>
+            <a:pPr lvl="1"/>
+            <a:r>
+              <a:rPr lang="en-US" sz="3200" dirty="0" err="1">
+                <a:solidFill>
+                  <a:schemeClr val="tx1"/>
+                </a:solidFill>
+              </a:rPr>
+              <a:t>CommodityAnalysis.ipynb</a:t>
+            </a:r>
+            <a:endParaRPr lang="en-US" sz="3200" dirty="0">
+              <a:solidFill>
+                <a:schemeClr val="tx1"/>
+              </a:solidFill>
+            </a:endParaRPr>
+          </a:p>
+          <a:p>
+            <a:pPr lvl="1"/>
+            <a:r>
+              <a:rPr lang="en-US" sz="3200" dirty="0">
+                <a:solidFill>
+                  <a:schemeClr val="tx1"/>
+                </a:solidFill>
+              </a:rPr>
+              <a:t>SC-</a:t>
+            </a:r>
+            <a:r>
+              <a:rPr lang="en-US" sz="3200" dirty="0" err="1">
+                <a:solidFill>
+                  <a:schemeClr val="tx1"/>
+                </a:solidFill>
+              </a:rPr>
+              <a:t>population.ipynb</a:t>
+            </a:r>
+            <a:endParaRPr lang="en-US" sz="3200" dirty="0">
+              <a:solidFill>
+                <a:schemeClr val="tx1"/>
+              </a:solidFill>
+            </a:endParaRPr>
+          </a:p>
+          <a:p>
+            <a:pPr lvl="1"/>
+            <a:endParaRPr lang="en-US" sz="2600" dirty="0">
+              <a:solidFill>
+                <a:schemeClr val="tx1"/>
+              </a:solidFill>
+            </a:endParaRPr>
+          </a:p>
+          <a:p>
+            <a:endParaRPr lang="en-US" sz="2600" dirty="0">
+              <a:solidFill>
+                <a:schemeClr val="tx1"/>
+              </a:solidFill>
+            </a:endParaRPr>
           </a:p>
         </p:txBody>
       </p:sp>

</xml_diff>

<commit_message>
move images to results folder. Left Jupyter Notebooks, persentatio and Readme on main
</commit_message>
<xml_diff>
--- a/Texas Housing Market Analysis PowerPoint.pptx
+++ b/Texas Housing Market Analysis PowerPoint.pptx
@@ -5886,8 +5886,8 @@
         </p:blipFill>
         <p:spPr>
           <a:xfrm>
-            <a:off x="-18" y="124093"/>
-            <a:ext cx="12191980" cy="6857990"/>
+            <a:off x="-18" y="0"/>
+            <a:ext cx="12191980" cy="6982083"/>
           </a:xfrm>
           <a:prstGeom prst="rect">
             <a:avLst/>

</xml_diff>